<commit_message>
[ProgrammingSRC] second version of talk
</commit_message>
<xml_diff>
--- a/Programming_SRC/talk.pptx
+++ b/Programming_SRC/talk.pptx
@@ -168,7 +168,7 @@
 
 <file path=ppt/commentAuthors.xml><?xml version="1.0" encoding="utf-8"?>
 <p:cmAuthorLst xmlns:a="http://schemas.openxmlformats.org/drawingml/2006/main" xmlns:r="http://schemas.openxmlformats.org/officeDocument/2006/relationships" xmlns:p="http://schemas.openxmlformats.org/presentationml/2006/main">
-  <p:cmAuthor id="1" name="Tobias Dürschmid" initials="TD" lastIdx="1" clrIdx="0">
+  <p:cmAuthor id="1" name="Tobias Dürschmid" initials="TD" lastIdx="2" clrIdx="0">
     <p:extLst>
       <p:ext uri="{19B8F6BF-5375-455C-9EA6-DF929625EA0E}">
         <p15:presenceInfo xmlns:p15="http://schemas.microsoft.com/office/powerpoint/2012/main" userId="e97234b2386ce739" providerId="Windows Live"/>
@@ -1711,7 +1711,7 @@
           <a:graphicData uri="http://schemas.openxmlformats.org/presentationml/2006/ole">
             <mc:AlternateContent xmlns:mc="http://schemas.openxmlformats.org/markup-compatibility/2006">
               <mc:Choice xmlns:v="urn:schemas-microsoft-com:vml" Requires="v">
-                <p:oleObj spid="_x0000_s140726" name="Image" r:id="rId3" imgW="3221337" imgH="1845301" progId="Photoshop.Image.9">
+                <p:oleObj spid="_x0000_s140756" name="Image" r:id="rId3" imgW="3221337" imgH="1845301" progId="Photoshop.Image.9">
                   <p:embed/>
                 </p:oleObj>
               </mc:Choice>
@@ -2881,7 +2881,7 @@
           <a:graphicData uri="http://schemas.openxmlformats.org/presentationml/2006/ole">
             <mc:AlternateContent xmlns:mc="http://schemas.openxmlformats.org/markup-compatibility/2006">
               <mc:Choice xmlns:v="urn:schemas-microsoft-com:vml" Requires="v">
-                <p:oleObj spid="_x0000_s1470" name="Image" r:id="rId7" imgW="3221337" imgH="1845301" progId="Photoshop.Image.9">
+                <p:oleObj spid="_x0000_s1500" name="Image" r:id="rId7" imgW="3221337" imgH="1845301" progId="Photoshop.Image.9">
                   <p:embed/>
                 </p:oleObj>
               </mc:Choice>
@@ -3512,7 +3512,14 @@
             </a:br>
             <a:r>
               <a:rPr lang="en-US" dirty="0"/>
-              <a:t>A Social Coding tool for Code Reviews inside the IDE </a:t>
+              <a:t>A Social Coding tool for </a:t>
+            </a:r>
+            <a:br>
+              <a:rPr lang="en-US" dirty="0"/>
+            </a:br>
+            <a:r>
+              <a:rPr lang="en-US" dirty="0"/>
+              <a:t>Code Reviews inside the IDE </a:t>
             </a:r>
             <a:br>
               <a:rPr lang="en-US" dirty="0"/>
@@ -3549,7 +3556,7 @@
               </a:lnSpc>
             </a:pPr>
             <a:r>
-              <a:rPr lang="de-DE" b="1" dirty="0">
+              <a:rPr lang="de-DE" dirty="0">
                 <a:solidFill>
                   <a:srgbClr val="DD640C"/>
                 </a:solidFill>
@@ -3565,7 +3572,15 @@
             </a:pPr>
             <a:r>
               <a:rPr lang="de-DE" dirty="0"/>
-              <a:t>tobias.duerschmid@student.hpi.de</a:t>
+              <a:t>Hasso Plattner Institute, University </a:t>
+            </a:r>
+            <a:r>
+              <a:rPr lang="de-DE" dirty="0" err="1"/>
+              <a:t>of</a:t>
+            </a:r>
+            <a:r>
+              <a:rPr lang="de-DE" dirty="0"/>
+              <a:t> Potsdam, Germany</a:t>
             </a:r>
           </a:p>
           <a:p>
@@ -3576,15 +3591,7 @@
             </a:pPr>
             <a:r>
               <a:rPr lang="de-DE" dirty="0"/>
-              <a:t>Hasso Plattner Institute, University </a:t>
-            </a:r>
-            <a:r>
-              <a:rPr lang="de-DE" dirty="0" err="1"/>
-              <a:t>of</a:t>
-            </a:r>
-            <a:r>
-              <a:rPr lang="de-DE" dirty="0"/>
-              <a:t> Potsdam</a:t>
+              <a:t>tobias.duerschmid@student.hpi.de</a:t>
             </a:r>
           </a:p>
         </p:txBody>
@@ -3642,7 +3649,7 @@
           <a:p>
             <a:r>
               <a:rPr lang="de-DE" dirty="0" err="1"/>
-              <a:t>Discussion</a:t>
+              <a:t>Conclusion</a:t>
             </a:r>
             <a:endParaRPr lang="de-DE" dirty="0"/>
           </a:p>
@@ -3725,98 +3732,275 @@
           <a:lstStyle/>
           <a:p>
             <a:pPr>
+              <a:lnSpc>
+                <a:spcPct val="150000"/>
+              </a:lnSpc>
               <a:buFontTx/>
               <a:buChar char="-"/>
             </a:pPr>
             <a:r>
-              <a:rPr lang="en-US" dirty="0"/>
-              <a:t>Enable adding comments to external libraries or frameworks</a:t>
-            </a:r>
-            <a:br>
-              <a:rPr lang="en-US" dirty="0"/>
-            </a:br>
-            <a:r>
-              <a:rPr lang="en-US" dirty="0"/>
-              <a:t>Give </a:t>
-            </a:r>
-            <a:r>
-              <a:rPr lang="en-US" b="1" dirty="0">
+              <a:rPr lang="de-DE" dirty="0"/>
+              <a:t>New </a:t>
+            </a:r>
+            <a:r>
+              <a:rPr lang="de-DE" dirty="0" err="1"/>
+              <a:t>approach</a:t>
+            </a:r>
+            <a:r>
+              <a:rPr lang="de-DE" dirty="0"/>
+              <a:t> </a:t>
+            </a:r>
+            <a:r>
+              <a:rPr lang="de-DE" dirty="0" err="1"/>
+              <a:t>for</a:t>
+            </a:r>
+            <a:r>
+              <a:rPr lang="de-DE" dirty="0"/>
+              <a:t> </a:t>
+            </a:r>
+            <a:r>
+              <a:rPr lang="de-DE" b="1" dirty="0" err="1">
                 <a:solidFill>
-                  <a:srgbClr val="00B050"/>
+                  <a:srgbClr val="DD640C"/>
                 </a:solidFill>
               </a:rPr>
-              <a:t>feedback to developers of third party software</a:t>
+              <a:t>merging</a:t>
+            </a:r>
+            <a:r>
+              <a:rPr lang="de-DE" b="1" dirty="0">
+                <a:solidFill>
+                  <a:srgbClr val="DD640C"/>
+                </a:solidFill>
+              </a:rPr>
+              <a:t> </a:t>
+            </a:r>
+            <a:r>
+              <a:rPr lang="de-DE" b="1" dirty="0" err="1">
+                <a:solidFill>
+                  <a:srgbClr val="DD640C"/>
+                </a:solidFill>
+              </a:rPr>
+              <a:t>reading</a:t>
+            </a:r>
+            <a:r>
+              <a:rPr lang="de-DE" b="1" dirty="0">
+                <a:solidFill>
+                  <a:srgbClr val="DD640C"/>
+                </a:solidFill>
+              </a:rPr>
+              <a:t> </a:t>
+            </a:r>
+            <a:r>
+              <a:rPr lang="de-DE" dirty="0" err="1"/>
+              <a:t>code</a:t>
+            </a:r>
+            <a:r>
+              <a:rPr lang="de-DE" dirty="0"/>
+              <a:t> </a:t>
             </a:r>
             <a:br>
-              <a:rPr lang="en-US" b="1" dirty="0"/>
+              <a:rPr lang="de-DE" dirty="0"/>
             </a:br>
-            <a:endParaRPr lang="en-US" dirty="0"/>
+            <a:r>
+              <a:rPr lang="de-DE" dirty="0" err="1"/>
+              <a:t>with</a:t>
+            </a:r>
+            <a:r>
+              <a:rPr lang="de-DE" dirty="0"/>
+              <a:t> </a:t>
+            </a:r>
+            <a:r>
+              <a:rPr lang="de-DE" b="1" dirty="0" err="1">
+                <a:solidFill>
+                  <a:srgbClr val="DD640C"/>
+                </a:solidFill>
+              </a:rPr>
+              <a:t>adding</a:t>
+            </a:r>
+            <a:r>
+              <a:rPr lang="de-DE" b="1" dirty="0">
+                <a:solidFill>
+                  <a:srgbClr val="DD640C"/>
+                </a:solidFill>
+              </a:rPr>
+              <a:t> </a:t>
+            </a:r>
+            <a:r>
+              <a:rPr lang="de-DE" b="1" dirty="0" err="1">
+                <a:solidFill>
+                  <a:srgbClr val="DD640C"/>
+                </a:solidFill>
+              </a:rPr>
+              <a:t>reviews</a:t>
+            </a:r>
+            <a:endParaRPr lang="de-DE" b="1" dirty="0">
+              <a:solidFill>
+                <a:srgbClr val="DD640C"/>
+              </a:solidFill>
+            </a:endParaRPr>
           </a:p>
           <a:p>
             <a:pPr>
+              <a:lnSpc>
+                <a:spcPct val="150000"/>
+              </a:lnSpc>
               <a:buFontTx/>
               <a:buChar char="-"/>
             </a:pPr>
-            <a:r>
-              <a:rPr lang="en-US" dirty="0"/>
-              <a:t>Source code comments will move out of the code base into the social coding comment database</a:t>
-            </a:r>
-            <a:br>
-              <a:rPr lang="en-US" dirty="0"/>
-            </a:br>
-            <a:r>
-              <a:rPr lang="en-US" dirty="0"/>
-              <a:t>Keeps the code </a:t>
-            </a:r>
-            <a:r>
-              <a:rPr lang="en-US" b="1" dirty="0">
-                <a:solidFill>
-                  <a:srgbClr val="00B050"/>
-                </a:solidFill>
-              </a:rPr>
-              <a:t>clean and focused</a:t>
-            </a:r>
-            <a:r>
-              <a:rPr lang="en-US" dirty="0"/>
-              <a:t>.</a:t>
-            </a:r>
-            <a:br>
-              <a:rPr lang="en-US" dirty="0"/>
-            </a:br>
-            <a:endParaRPr lang="en-US" dirty="0"/>
+            <a:endParaRPr lang="de-DE" b="1" dirty="0">
+              <a:solidFill>
+                <a:srgbClr val="DD640C"/>
+              </a:solidFill>
+            </a:endParaRPr>
           </a:p>
           <a:p>
             <a:pPr>
+              <a:lnSpc>
+                <a:spcPct val="150000"/>
+              </a:lnSpc>
               <a:buFontTx/>
               <a:buChar char="-"/>
             </a:pPr>
             <a:r>
-              <a:rPr lang="en-US" dirty="0"/>
-              <a:t>Correctness </a:t>
-            </a:r>
-            <a:r>
-              <a:rPr lang="en-US" b="1" dirty="0">
+              <a:rPr lang="de-DE" dirty="0" err="1"/>
+              <a:t>Depict</a:t>
+            </a:r>
+            <a:r>
+              <a:rPr lang="de-DE" dirty="0"/>
+              <a:t> programmging </a:t>
+            </a:r>
+            <a:r>
+              <a:rPr lang="de-DE" dirty="0" err="1"/>
+              <a:t>as</a:t>
+            </a:r>
+            <a:r>
+              <a:rPr lang="de-DE" dirty="0"/>
+              <a:t> </a:t>
+            </a:r>
+            <a:r>
+              <a:rPr lang="de-DE" b="1" dirty="0" err="1">
                 <a:solidFill>
-                  <a:srgbClr val="FF0000"/>
+                  <a:srgbClr val="DD640C"/>
                 </a:solidFill>
               </a:rPr>
-              <a:t>only if all working developers have installed the tool</a:t>
-            </a:r>
-            <a:br>
-              <a:rPr lang="en-US" b="1" dirty="0">
+              <a:t>social</a:t>
+            </a:r>
+            <a:r>
+              <a:rPr lang="de-DE" b="1" dirty="0">
                 <a:solidFill>
-                  <a:srgbClr val="FF0000"/>
+                  <a:srgbClr val="DD640C"/>
                 </a:solidFill>
               </a:rPr>
-            </a:br>
-            <a:r>
-              <a:rPr lang="en-US" dirty="0"/>
-              <a:t>Moving a method with attached comment leads to inconsistent state </a:t>
-            </a:r>
-            <a:br>
-              <a:rPr lang="en-US" dirty="0"/>
-            </a:br>
-            <a:endParaRPr lang="de-DE" dirty="0"/>
+              <a:t> </a:t>
+            </a:r>
+            <a:r>
+              <a:rPr lang="de-DE" b="1" dirty="0" err="1">
+                <a:solidFill>
+                  <a:srgbClr val="DD640C"/>
+                </a:solidFill>
+              </a:rPr>
+              <a:t>activity</a:t>
+            </a:r>
+            <a:r>
+              <a:rPr lang="de-DE" b="1" dirty="0">
+                <a:solidFill>
+                  <a:srgbClr val="DD640C"/>
+                </a:solidFill>
+              </a:rPr>
+              <a:t>.</a:t>
+            </a:r>
+          </a:p>
+          <a:p>
+            <a:pPr>
+              <a:lnSpc>
+                <a:spcPct val="150000"/>
+              </a:lnSpc>
+              <a:buFontTx/>
+              <a:buChar char="-"/>
+            </a:pPr>
+            <a:endParaRPr lang="de-DE" b="1" dirty="0">
+              <a:solidFill>
+                <a:srgbClr val="DD640C"/>
+              </a:solidFill>
+            </a:endParaRPr>
+          </a:p>
+          <a:p>
+            <a:pPr>
+              <a:lnSpc>
+                <a:spcPct val="150000"/>
+              </a:lnSpc>
+              <a:buFontTx/>
+              <a:buChar char="-"/>
+            </a:pPr>
+            <a:r>
+              <a:rPr lang="de-DE" dirty="0" err="1"/>
+              <a:t>To</a:t>
+            </a:r>
+            <a:r>
+              <a:rPr lang="de-DE" dirty="0"/>
+              <a:t> </a:t>
+            </a:r>
+            <a:r>
+              <a:rPr lang="de-DE" dirty="0" err="1"/>
+              <a:t>be</a:t>
+            </a:r>
+            <a:r>
+              <a:rPr lang="de-DE" dirty="0"/>
+              <a:t> </a:t>
+            </a:r>
+            <a:r>
+              <a:rPr lang="de-DE" dirty="0" err="1"/>
+              <a:t>used</a:t>
+            </a:r>
+            <a:r>
+              <a:rPr lang="de-DE" dirty="0"/>
+              <a:t> </a:t>
+            </a:r>
+            <a:r>
+              <a:rPr lang="de-DE" b="1" dirty="0" err="1">
+                <a:solidFill>
+                  <a:srgbClr val="DD640C"/>
+                </a:solidFill>
+              </a:rPr>
+              <a:t>orthogonally</a:t>
+            </a:r>
+            <a:r>
+              <a:rPr lang="de-DE" b="1" dirty="0">
+                <a:solidFill>
+                  <a:srgbClr val="DD640C"/>
+                </a:solidFill>
+              </a:rPr>
+              <a:t> </a:t>
+            </a:r>
+            <a:r>
+              <a:rPr lang="de-DE" b="1" dirty="0" err="1">
+                <a:solidFill>
+                  <a:srgbClr val="DD640C"/>
+                </a:solidFill>
+              </a:rPr>
+              <a:t>to</a:t>
+            </a:r>
+            <a:r>
+              <a:rPr lang="de-DE" b="1" dirty="0">
+                <a:solidFill>
+                  <a:srgbClr val="DD640C"/>
+                </a:solidFill>
+              </a:rPr>
+              <a:t> pull </a:t>
+            </a:r>
+            <a:r>
+              <a:rPr lang="de-DE" b="1" dirty="0" err="1">
+                <a:solidFill>
+                  <a:srgbClr val="DD640C"/>
+                </a:solidFill>
+              </a:rPr>
+              <a:t>requests</a:t>
+            </a:r>
+            <a:endParaRPr lang="de-DE" b="1" dirty="0">
+              <a:solidFill>
+                <a:srgbClr val="DD640C"/>
+              </a:solidFill>
+            </a:endParaRPr>
           </a:p>
         </p:txBody>
       </p:sp>
@@ -4132,87 +4316,111 @@
           <a:lstStyle/>
           <a:p>
             <a:pPr>
+              <a:lnSpc>
+                <a:spcPct val="200000"/>
+              </a:lnSpc>
               <a:buFontTx/>
               <a:buChar char="-"/>
             </a:pPr>
-            <a:endParaRPr lang="en-US" dirty="0"/>
+            <a:r>
+              <a:rPr lang="en-US" dirty="0"/>
+              <a:t>Finding </a:t>
+            </a:r>
+            <a:r>
+              <a:rPr lang="en-US" b="1" dirty="0">
+                <a:solidFill>
+                  <a:srgbClr val="DD640C"/>
+                </a:solidFill>
+              </a:rPr>
+              <a:t>defects</a:t>
+            </a:r>
           </a:p>
           <a:p>
             <a:pPr>
+              <a:lnSpc>
+                <a:spcPct val="200000"/>
+              </a:lnSpc>
               <a:buFontTx/>
               <a:buChar char="-"/>
             </a:pPr>
             <a:r>
               <a:rPr lang="en-US" dirty="0"/>
-              <a:t>finding defects</a:t>
+              <a:t>Improving </a:t>
+            </a:r>
+            <a:r>
+              <a:rPr lang="en-US" b="1" dirty="0">
+                <a:solidFill>
+                  <a:srgbClr val="DD640C"/>
+                </a:solidFill>
+              </a:rPr>
+              <a:t>code quality</a:t>
             </a:r>
           </a:p>
           <a:p>
             <a:pPr>
+              <a:lnSpc>
+                <a:spcPct val="200000"/>
+              </a:lnSpc>
               <a:buFontTx/>
               <a:buChar char="-"/>
             </a:pPr>
-            <a:endParaRPr lang="en-US" dirty="0"/>
+            <a:r>
+              <a:rPr lang="en-US" dirty="0"/>
+              <a:t>Discussing </a:t>
+            </a:r>
+            <a:r>
+              <a:rPr lang="en-US" b="1" dirty="0">
+                <a:solidFill>
+                  <a:srgbClr val="DD640C"/>
+                </a:solidFill>
+              </a:rPr>
+              <a:t>alternative </a:t>
+            </a:r>
+            <a:r>
+              <a:rPr lang="en-US" dirty="0"/>
+              <a:t>solutions</a:t>
+            </a:r>
           </a:p>
           <a:p>
             <a:pPr>
+              <a:lnSpc>
+                <a:spcPct val="200000"/>
+              </a:lnSpc>
               <a:buFontTx/>
               <a:buChar char="-"/>
             </a:pPr>
             <a:r>
               <a:rPr lang="en-US" dirty="0"/>
-              <a:t>improving code quality</a:t>
+              <a:t>Transferring </a:t>
+            </a:r>
+            <a:r>
+              <a:rPr lang="en-US" b="1" dirty="0">
+                <a:solidFill>
+                  <a:srgbClr val="DD640C"/>
+                </a:solidFill>
+              </a:rPr>
+              <a:t>knowledge</a:t>
             </a:r>
           </a:p>
           <a:p>
             <a:pPr>
+              <a:lnSpc>
+                <a:spcPct val="200000"/>
+              </a:lnSpc>
               <a:buFontTx/>
               <a:buChar char="-"/>
             </a:pPr>
-            <a:endParaRPr lang="en-US" dirty="0"/>
-          </a:p>
-          <a:p>
-            <a:pPr>
-              <a:buFontTx/>
-              <a:buChar char="-"/>
-            </a:pPr>
             <a:r>
               <a:rPr lang="en-US" dirty="0"/>
-              <a:t>discussing alternative solutions</a:t>
-            </a:r>
-          </a:p>
-          <a:p>
-            <a:pPr>
-              <a:buFontTx/>
-              <a:buChar char="-"/>
-            </a:pPr>
-            <a:endParaRPr lang="en-US" dirty="0"/>
-          </a:p>
-          <a:p>
-            <a:pPr>
-              <a:buFontTx/>
-              <a:buChar char="-"/>
-            </a:pPr>
-            <a:r>
-              <a:rPr lang="en-US" dirty="0"/>
-              <a:t>transferring knowledge</a:t>
-            </a:r>
-          </a:p>
-          <a:p>
-            <a:pPr>
-              <a:buFontTx/>
-              <a:buChar char="-"/>
-            </a:pPr>
-            <a:endParaRPr lang="en-US" dirty="0"/>
-          </a:p>
-          <a:p>
-            <a:pPr>
-              <a:buFontTx/>
-              <a:buChar char="-"/>
-            </a:pPr>
-            <a:r>
-              <a:rPr lang="en-US" dirty="0"/>
-              <a:t>improving team awareness </a:t>
+              <a:t>Improving </a:t>
+            </a:r>
+            <a:r>
+              <a:rPr lang="en-US" b="1" dirty="0">
+                <a:solidFill>
+                  <a:srgbClr val="DD640C"/>
+                </a:solidFill>
+              </a:rPr>
+              <a:t>team awareness </a:t>
             </a:r>
             <a:br>
               <a:rPr lang="en-US" dirty="0"/>
@@ -4250,6 +4458,156 @@
           </a:p>
         </p:txBody>
       </p:sp>
+      <p:pic>
+        <p:nvPicPr>
+          <p:cNvPr id="7" name="Grafik 6" descr="Besprechung"/>
+          <p:cNvPicPr>
+            <a:picLocks noChangeAspect="1"/>
+          </p:cNvPicPr>
+          <p:nvPr/>
+        </p:nvPicPr>
+        <p:blipFill>
+          <a:blip r:embed="rId3">
+            <a:extLst>
+              <a:ext uri="{96DAC541-7B7A-43D3-8B79-37D633B846F1}">
+                <asvg:svgBlip xmlns:asvg="http://schemas.microsoft.com/office/drawing/2016/SVG/main" r:embed="rId4"/>
+              </a:ext>
+            </a:extLst>
+          </a:blip>
+          <a:stretch>
+            <a:fillRect/>
+          </a:stretch>
+        </p:blipFill>
+        <p:spPr>
+          <a:xfrm>
+            <a:off x="5331941" y="4505130"/>
+            <a:ext cx="914400" cy="914400"/>
+          </a:xfrm>
+          <a:prstGeom prst="rect">
+            <a:avLst/>
+          </a:prstGeom>
+        </p:spPr>
+      </p:pic>
+      <p:pic>
+        <p:nvPicPr>
+          <p:cNvPr id="14" name="Grafik 13" descr="Aufwärtstrend"/>
+          <p:cNvPicPr>
+            <a:picLocks noChangeAspect="1"/>
+          </p:cNvPicPr>
+          <p:nvPr/>
+        </p:nvPicPr>
+        <p:blipFill>
+          <a:blip r:embed="rId5">
+            <a:extLst>
+              <a:ext uri="{96DAC541-7B7A-43D3-8B79-37D633B846F1}">
+                <asvg:svgBlip xmlns:asvg="http://schemas.microsoft.com/office/drawing/2016/SVG/main" r:embed="rId6"/>
+              </a:ext>
+            </a:extLst>
+          </a:blip>
+          <a:stretch>
+            <a:fillRect/>
+          </a:stretch>
+        </p:blipFill>
+        <p:spPr>
+          <a:xfrm>
+            <a:off x="4665712" y="2089168"/>
+            <a:ext cx="914400" cy="914400"/>
+          </a:xfrm>
+          <a:prstGeom prst="rect">
+            <a:avLst/>
+          </a:prstGeom>
+        </p:spPr>
+      </p:pic>
+      <p:pic>
+        <p:nvPicPr>
+          <p:cNvPr id="18" name="Grafik 17" descr="Gehirn im Kopf"/>
+          <p:cNvPicPr>
+            <a:picLocks noChangeAspect="1"/>
+          </p:cNvPicPr>
+          <p:nvPr/>
+        </p:nvPicPr>
+        <p:blipFill>
+          <a:blip r:embed="rId7">
+            <a:extLst>
+              <a:ext uri="{96DAC541-7B7A-43D3-8B79-37D633B846F1}">
+                <asvg:svgBlip xmlns:asvg="http://schemas.microsoft.com/office/drawing/2016/SVG/main" r:embed="rId8"/>
+              </a:ext>
+            </a:extLst>
+          </a:blip>
+          <a:stretch>
+            <a:fillRect/>
+          </a:stretch>
+        </p:blipFill>
+        <p:spPr>
+          <a:xfrm>
+            <a:off x="4545447" y="3665015"/>
+            <a:ext cx="914400" cy="914400"/>
+          </a:xfrm>
+          <a:prstGeom prst="rect">
+            <a:avLst/>
+          </a:prstGeom>
+        </p:spPr>
+      </p:pic>
+      <p:pic>
+        <p:nvPicPr>
+          <p:cNvPr id="20" name="Grafik 19" descr="Blitz"/>
+          <p:cNvPicPr>
+            <a:picLocks noChangeAspect="1"/>
+          </p:cNvPicPr>
+          <p:nvPr/>
+        </p:nvPicPr>
+        <p:blipFill>
+          <a:blip r:embed="rId9">
+            <a:extLst>
+              <a:ext uri="{96DAC541-7B7A-43D3-8B79-37D633B846F1}">
+                <asvg:svgBlip xmlns:asvg="http://schemas.microsoft.com/office/drawing/2016/SVG/main" r:embed="rId10"/>
+              </a:ext>
+            </a:extLst>
+          </a:blip>
+          <a:stretch>
+            <a:fillRect/>
+          </a:stretch>
+        </p:blipFill>
+        <p:spPr>
+          <a:xfrm>
+            <a:off x="3419872" y="1291082"/>
+            <a:ext cx="914400" cy="914400"/>
+          </a:xfrm>
+          <a:prstGeom prst="rect">
+            <a:avLst/>
+          </a:prstGeom>
+        </p:spPr>
+      </p:pic>
+      <p:pic>
+        <p:nvPicPr>
+          <p:cNvPr id="24" name="Grafik 23" descr="Liste"/>
+          <p:cNvPicPr>
+            <a:picLocks noChangeAspect="1"/>
+          </p:cNvPicPr>
+          <p:nvPr/>
+        </p:nvPicPr>
+        <p:blipFill>
+          <a:blip r:embed="rId11">
+            <a:extLst>
+              <a:ext uri="{96DAC541-7B7A-43D3-8B79-37D633B846F1}">
+                <asvg:svgBlip xmlns:asvg="http://schemas.microsoft.com/office/drawing/2016/SVG/main" r:embed="rId12"/>
+              </a:ext>
+            </a:extLst>
+          </a:blip>
+          <a:stretch>
+            <a:fillRect/>
+          </a:stretch>
+        </p:blipFill>
+        <p:spPr>
+          <a:xfrm>
+            <a:off x="5759861" y="2946648"/>
+            <a:ext cx="914400" cy="914400"/>
+          </a:xfrm>
+          <a:prstGeom prst="rect">
+            <a:avLst/>
+          </a:prstGeom>
+        </p:spPr>
+      </p:pic>
     </p:spTree>
     <p:extLst>
       <p:ext uri="{BB962C8B-B14F-4D97-AF65-F5344CB8AC3E}">
@@ -4364,240 +4722,299 @@
           </a:p>
         </p:txBody>
       </p:sp>
-      <mc:AlternateContent xmlns:mc="http://schemas.openxmlformats.org/markup-compatibility/2006" xmlns:a14="http://schemas.microsoft.com/office/drawing/2010/main">
-        <mc:Choice Requires="a14">
-          <p:sp>
-            <p:nvSpPr>
-              <p:cNvPr id="8" name="Inhaltsplatzhalter 7"/>
-              <p:cNvSpPr>
-                <a:spLocks noGrp="1"/>
-              </p:cNvSpPr>
-              <p:nvPr>
-                <p:ph idx="1"/>
-              </p:nvPr>
-            </p:nvSpPr>
-            <p:spPr>
-              <a:xfrm>
-                <a:off x="685800" y="1274763"/>
-                <a:ext cx="7772400" cy="5257800"/>
-              </a:xfrm>
-            </p:spPr>
-            <p:txBody>
-              <a:bodyPr/>
-              <a:lstStyle/>
-              <a:p>
-                <a:pPr>
-                  <a:buFontTx/>
-                  <a:buChar char="-"/>
-                </a:pPr>
-                <a:r>
-                  <a:rPr lang="en-US" dirty="0"/>
-                  <a:t>Contemporary code reviews are done only </a:t>
-                </a:r>
-                <a:r>
-                  <a:rPr lang="en-US" b="1" dirty="0">
-                    <a:solidFill>
-                      <a:srgbClr val="DD640C"/>
-                    </a:solidFill>
-                  </a:rPr>
-                  <a:t>once</a:t>
-                </a:r>
-                <a:r>
-                  <a:rPr lang="en-US" dirty="0">
-                    <a:solidFill>
-                      <a:srgbClr val="DD640C"/>
-                    </a:solidFill>
-                  </a:rPr>
-                  <a:t> </a:t>
-                </a:r>
-                <a:r>
-                  <a:rPr lang="en-US" dirty="0"/>
-                  <a:t>before a pull request is merged</a:t>
-                </a:r>
-              </a:p>
-              <a:p>
-                <a:pPr lvl="1">
-                  <a:buFontTx/>
-                  <a:buChar char="-"/>
-                </a:pPr>
-                <a:r>
-                  <a:rPr lang="en-US" dirty="0"/>
-                  <a:t>No continuous feedback on code quality </a:t>
-                </a:r>
-                <a:r>
-                  <a:rPr lang="de-DE" dirty="0"/>
-                  <a:t>(</a:t>
-                </a:r>
-                <a:r>
-                  <a:rPr lang="en-US" dirty="0"/>
-                  <a:t>especially of </a:t>
-                </a:r>
-                <a:r>
-                  <a:rPr lang="en-US" b="1" dirty="0">
-                    <a:solidFill>
-                      <a:srgbClr val="DD640C"/>
-                    </a:solidFill>
-                  </a:rPr>
-                  <a:t>legacy code</a:t>
-                </a:r>
-                <a:r>
-                  <a:rPr lang="de-DE" dirty="0"/>
-                  <a:t>)</a:t>
-                </a:r>
-              </a:p>
-              <a:p>
-                <a:pPr lvl="1">
-                  <a:buFontTx/>
-                  <a:buChar char="-"/>
-                </a:pPr>
-                <a:r>
-                  <a:rPr lang="en-US" dirty="0"/>
-                  <a:t>No support for questions of </a:t>
-                </a:r>
-                <a:r>
-                  <a:rPr lang="en-US" b="1" dirty="0">
-                    <a:solidFill>
-                      <a:srgbClr val="DD640C"/>
-                    </a:solidFill>
-                  </a:rPr>
-                  <a:t>new developers</a:t>
-                </a:r>
-                <a:r>
-                  <a:rPr lang="en-US" b="1" dirty="0"/>
-                  <a:t> </a:t>
-                </a:r>
-                <a:r>
-                  <a:rPr lang="en-US" dirty="0"/>
-                  <a:t>concerning existing code </a:t>
-                </a:r>
-              </a:p>
-              <a:p>
-                <a:pPr lvl="1">
-                  <a:buFontTx/>
-                  <a:buChar char="-"/>
-                </a:pPr>
-                <a:r>
-                  <a:rPr lang="en-US" dirty="0"/>
-                  <a:t>Forces the developers to leave their IDE for commenting </a:t>
-                </a:r>
-                <a:br>
-                  <a:rPr lang="en-US" dirty="0"/>
-                </a:br>
-                <a:r>
-                  <a:rPr lang="en-US" dirty="0"/>
-                  <a:t>on code </a:t>
-                </a:r>
-                <a14:m>
-                  <m:oMath xmlns:m="http://schemas.openxmlformats.org/officeDocument/2006/math">
-                    <m:r>
-                      <a:rPr lang="en-US" i="1" dirty="0" smtClean="0">
-                        <a:latin typeface="Cambria Math" panose="02040503050406030204" pitchFamily="18" charset="0"/>
-                        <a:ea typeface="Cambria Math" panose="02040503050406030204" pitchFamily="18" charset="0"/>
-                      </a:rPr>
-                      <m:t>⇒</m:t>
-                    </m:r>
-                  </m:oMath>
-                </a14:m>
-                <a:r>
-                  <a:rPr lang="en-US" dirty="0"/>
-                  <a:t> </a:t>
-                </a:r>
-                <a:r>
-                  <a:rPr lang="en-US" b="1" dirty="0">
-                    <a:solidFill>
-                      <a:srgbClr val="DD640C"/>
-                    </a:solidFill>
-                  </a:rPr>
-                  <a:t>Context Switch </a:t>
-                </a:r>
-              </a:p>
-              <a:p>
-                <a:pPr>
-                  <a:buFontTx/>
-                  <a:buChar char="-"/>
-                </a:pPr>
-                <a:endParaRPr lang="en-US" dirty="0"/>
-              </a:p>
-              <a:p>
-                <a:pPr>
-                  <a:buFontTx/>
-                  <a:buChar char="-"/>
-                </a:pPr>
-                <a:r>
-                  <a:rPr lang="en-US" dirty="0"/>
-                  <a:t>How to give </a:t>
-                </a:r>
-                <a:r>
-                  <a:rPr lang="en-US" b="1" dirty="0">
-                    <a:solidFill>
-                      <a:srgbClr val="DD640C"/>
-                    </a:solidFill>
-                  </a:rPr>
-                  <a:t>continuous feedback</a:t>
-                </a:r>
-                <a:r>
-                  <a:rPr lang="en-US" b="1" dirty="0"/>
-                  <a:t> </a:t>
-                </a:r>
-                <a:r>
-                  <a:rPr lang="en-US" dirty="0"/>
-                  <a:t>on code quality?</a:t>
-                </a:r>
-                <a:br>
-                  <a:rPr lang="en-US" dirty="0"/>
-                </a:br>
-                <a:br>
-                  <a:rPr lang="en-US" dirty="0"/>
-                </a:br>
-                <a:br>
-                  <a:rPr lang="de-DE" dirty="0"/>
-                </a:br>
-                <a:br>
-                  <a:rPr lang="en-US" dirty="0"/>
-                </a:br>
-                <a:endParaRPr lang="en-US" dirty="0"/>
-              </a:p>
-            </p:txBody>
-          </p:sp>
-        </mc:Choice>
-        <mc:Fallback xmlns="">
-          <p:sp>
-            <p:nvSpPr>
-              <p:cNvPr id="8" name="Inhaltsplatzhalter 7"/>
-              <p:cNvSpPr>
-                <a:spLocks noGrp="1" noRot="1" noChangeAspect="1" noMove="1" noResize="1" noEditPoints="1" noAdjustHandles="1" noChangeArrowheads="1" noChangeShapeType="1" noTextEdit="1"/>
-              </p:cNvSpPr>
-              <p:nvPr>
-                <p:ph idx="1"/>
-              </p:nvPr>
-            </p:nvSpPr>
-            <p:spPr>
-              <a:xfrm>
-                <a:off x="685800" y="1274763"/>
-                <a:ext cx="7772400" cy="5257800"/>
-              </a:xfrm>
-              <a:blipFill>
-                <a:blip r:embed="rId3"/>
-                <a:stretch>
-                  <a:fillRect l="-1098" t="-811"/>
-                </a:stretch>
-              </a:blipFill>
-            </p:spPr>
-            <p:txBody>
-              <a:bodyPr/>
-              <a:lstStyle/>
-              <a:p>
-                <a:r>
-                  <a:rPr lang="de-DE">
-                    <a:noFill/>
-                  </a:rPr>
-                  <a:t> </a:t>
-                </a:r>
-              </a:p>
-            </p:txBody>
-          </p:sp>
-        </mc:Fallback>
-      </mc:AlternateContent>
+      <p:sp>
+        <p:nvSpPr>
+          <p:cNvPr id="8" name="Inhaltsplatzhalter 7"/>
+          <p:cNvSpPr>
+            <a:spLocks noGrp="1"/>
+          </p:cNvSpPr>
+          <p:nvPr>
+            <p:ph idx="1"/>
+          </p:nvPr>
+        </p:nvSpPr>
+        <p:spPr>
+          <a:xfrm>
+            <a:off x="685800" y="1274763"/>
+            <a:ext cx="7772400" cy="5257800"/>
+          </a:xfrm>
+        </p:spPr>
+        <p:txBody>
+          <a:bodyPr/>
+          <a:lstStyle/>
+          <a:p>
+            <a:pPr>
+              <a:lnSpc>
+                <a:spcPct val="150000"/>
+              </a:lnSpc>
+              <a:buFontTx/>
+              <a:buChar char="-"/>
+            </a:pPr>
+            <a:r>
+              <a:rPr lang="en-US" dirty="0"/>
+              <a:t>Contemporary code reviews are done only </a:t>
+            </a:r>
+            <a:r>
+              <a:rPr lang="en-US" b="1" dirty="0">
+                <a:solidFill>
+                  <a:srgbClr val="DD640C"/>
+                </a:solidFill>
+              </a:rPr>
+              <a:t>once</a:t>
+            </a:r>
+            <a:r>
+              <a:rPr lang="en-US" dirty="0">
+                <a:solidFill>
+                  <a:srgbClr val="DD640C"/>
+                </a:solidFill>
+              </a:rPr>
+              <a:t> </a:t>
+            </a:r>
+            <a:r>
+              <a:rPr lang="en-US" dirty="0"/>
+              <a:t>before a pull request is merged</a:t>
+            </a:r>
+          </a:p>
+          <a:p>
+            <a:pPr lvl="1">
+              <a:lnSpc>
+                <a:spcPct val="150000"/>
+              </a:lnSpc>
+              <a:buFontTx/>
+              <a:buChar char="-"/>
+            </a:pPr>
+            <a:r>
+              <a:rPr lang="en-US" sz="2400" dirty="0"/>
+              <a:t>No feedback on </a:t>
+            </a:r>
+            <a:r>
+              <a:rPr lang="en-US" sz="2400" b="1" dirty="0">
+                <a:solidFill>
+                  <a:srgbClr val="DD640C"/>
+                </a:solidFill>
+              </a:rPr>
+              <a:t>legacy code</a:t>
+            </a:r>
+            <a:br>
+              <a:rPr lang="de-DE" sz="1100" b="1" dirty="0">
+                <a:solidFill>
+                  <a:srgbClr val="DD640C"/>
+                </a:solidFill>
+              </a:rPr>
+            </a:br>
+            <a:endParaRPr lang="en-US" sz="1100" dirty="0"/>
+          </a:p>
+          <a:p>
+            <a:pPr lvl="1">
+              <a:lnSpc>
+                <a:spcPct val="150000"/>
+              </a:lnSpc>
+              <a:buFontTx/>
+              <a:buChar char="-"/>
+            </a:pPr>
+            <a:r>
+              <a:rPr lang="en-US" sz="2400" dirty="0"/>
+              <a:t>No support for questions of </a:t>
+            </a:r>
+            <a:br>
+              <a:rPr lang="en-US" sz="2400" dirty="0"/>
+            </a:br>
+            <a:r>
+              <a:rPr lang="en-US" sz="2400" b="1" dirty="0">
+                <a:solidFill>
+                  <a:srgbClr val="DD640C"/>
+                </a:solidFill>
+              </a:rPr>
+              <a:t>new developers</a:t>
+            </a:r>
+            <a:r>
+              <a:rPr lang="en-US" sz="2400" b="1" dirty="0"/>
+              <a:t> </a:t>
+            </a:r>
+            <a:br>
+              <a:rPr lang="en-US" sz="1000" b="1" dirty="0"/>
+            </a:br>
+            <a:r>
+              <a:rPr lang="en-US" sz="200" b="1" dirty="0"/>
+              <a:t>  </a:t>
+            </a:r>
+            <a:r>
+              <a:rPr lang="en-US" sz="1000" dirty="0"/>
+              <a:t> </a:t>
+            </a:r>
+          </a:p>
+          <a:p>
+            <a:pPr lvl="1">
+              <a:lnSpc>
+                <a:spcPct val="150000"/>
+              </a:lnSpc>
+              <a:buFontTx/>
+              <a:buChar char="-"/>
+            </a:pPr>
+            <a:r>
+              <a:rPr lang="en-US" sz="2400" dirty="0"/>
+              <a:t>Involves </a:t>
+            </a:r>
+            <a:r>
+              <a:rPr lang="en-US" sz="2400" b="1" i="0" dirty="0">
+                <a:solidFill>
+                  <a:srgbClr val="DD640C"/>
+                </a:solidFill>
+                <a:latin typeface="+mj-lt"/>
+              </a:rPr>
+              <a:t>context</a:t>
+            </a:r>
+            <a:r>
+              <a:rPr lang="en-US" sz="2400" b="1" dirty="0">
+                <a:solidFill>
+                  <a:srgbClr val="DD640C"/>
+                </a:solidFill>
+              </a:rPr>
+              <a:t> switches</a:t>
+            </a:r>
+          </a:p>
+          <a:p>
+            <a:pPr marL="0" indent="0">
+              <a:lnSpc>
+                <a:spcPct val="150000"/>
+              </a:lnSpc>
+              <a:buNone/>
+            </a:pPr>
+            <a:r>
+              <a:rPr lang="en-US" sz="900" dirty="0"/>
+              <a:t> </a:t>
+            </a:r>
+            <a:endParaRPr lang="en-US" sz="2800" dirty="0"/>
+          </a:p>
+          <a:p>
+            <a:pPr>
+              <a:lnSpc>
+                <a:spcPct val="150000"/>
+              </a:lnSpc>
+              <a:buFontTx/>
+              <a:buChar char="-"/>
+            </a:pPr>
+            <a:r>
+              <a:rPr lang="en-US" dirty="0"/>
+              <a:t>How to make code reviews more </a:t>
+            </a:r>
+            <a:r>
+              <a:rPr lang="en-US" b="1" dirty="0">
+                <a:solidFill>
+                  <a:srgbClr val="DD640C"/>
+                </a:solidFill>
+              </a:rPr>
+              <a:t>live</a:t>
+            </a:r>
+            <a:r>
+              <a:rPr lang="en-US" dirty="0"/>
+              <a:t>?</a:t>
+            </a:r>
+            <a:br>
+              <a:rPr lang="en-US" dirty="0"/>
+            </a:br>
+            <a:br>
+              <a:rPr lang="en-US" dirty="0"/>
+            </a:br>
+            <a:br>
+              <a:rPr lang="de-DE" dirty="0"/>
+            </a:br>
+            <a:br>
+              <a:rPr lang="en-US" dirty="0"/>
+            </a:br>
+            <a:endParaRPr lang="en-US" dirty="0"/>
+          </a:p>
+        </p:txBody>
+      </p:sp>
+      <p:pic>
+        <p:nvPicPr>
+          <p:cNvPr id="9" name="Grafik 8" descr="Elternteil und Kind"/>
+          <p:cNvPicPr>
+            <a:picLocks noChangeAspect="1"/>
+          </p:cNvPicPr>
+          <p:nvPr/>
+        </p:nvPicPr>
+        <p:blipFill>
+          <a:blip r:embed="rId3">
+            <a:extLst>
+              <a:ext uri="{96DAC541-7B7A-43D3-8B79-37D633B846F1}">
+                <asvg:svgBlip xmlns:asvg="http://schemas.microsoft.com/office/drawing/2016/SVG/main" r:embed="rId4"/>
+              </a:ext>
+            </a:extLst>
+          </a:blip>
+          <a:stretch>
+            <a:fillRect/>
+          </a:stretch>
+        </p:blipFill>
+        <p:spPr>
+          <a:xfrm>
+            <a:off x="5596036" y="3498428"/>
+            <a:ext cx="914400" cy="914400"/>
+          </a:xfrm>
+          <a:prstGeom prst="rect">
+            <a:avLst/>
+          </a:prstGeom>
+        </p:spPr>
+      </p:pic>
+      <p:pic>
+        <p:nvPicPr>
+          <p:cNvPr id="11" name="Grafik 10" descr="Stundenglas"/>
+          <p:cNvPicPr>
+            <a:picLocks noChangeAspect="1"/>
+          </p:cNvPicPr>
+          <p:nvPr/>
+        </p:nvPicPr>
+        <p:blipFill>
+          <a:blip r:embed="rId5">
+            <a:extLst>
+              <a:ext uri="{96DAC541-7B7A-43D3-8B79-37D633B846F1}">
+                <asvg:svgBlip xmlns:asvg="http://schemas.microsoft.com/office/drawing/2016/SVG/main" r:embed="rId6"/>
+              </a:ext>
+            </a:extLst>
+          </a:blip>
+          <a:stretch>
+            <a:fillRect/>
+          </a:stretch>
+        </p:blipFill>
+        <p:spPr>
+          <a:xfrm>
+            <a:off x="5596036" y="2263924"/>
+            <a:ext cx="914400" cy="914400"/>
+          </a:xfrm>
+          <a:prstGeom prst="rect">
+            <a:avLst/>
+          </a:prstGeom>
+        </p:spPr>
+      </p:pic>
+      <p:pic>
+        <p:nvPicPr>
+          <p:cNvPr id="15" name="Grafik 14" descr="Wiederholung"/>
+          <p:cNvPicPr>
+            <a:picLocks noChangeAspect="1"/>
+          </p:cNvPicPr>
+          <p:nvPr/>
+        </p:nvPicPr>
+        <p:blipFill>
+          <a:blip r:embed="rId7">
+            <a:extLst>
+              <a:ext uri="{96DAC541-7B7A-43D3-8B79-37D633B846F1}">
+                <asvg:svgBlip xmlns:asvg="http://schemas.microsoft.com/office/drawing/2016/SVG/main" r:embed="rId8"/>
+              </a:ext>
+            </a:extLst>
+          </a:blip>
+          <a:stretch>
+            <a:fillRect/>
+          </a:stretch>
+        </p:blipFill>
+        <p:spPr>
+          <a:xfrm>
+            <a:off x="5596036" y="4647207"/>
+            <a:ext cx="914400" cy="914400"/>
+          </a:xfrm>
+          <a:prstGeom prst="rect">
+            <a:avLst/>
+          </a:prstGeom>
+        </p:spPr>
+      </p:pic>
     </p:spTree>
     <p:extLst>
       <p:ext uri="{BB962C8B-B14F-4D97-AF65-F5344CB8AC3E}">
@@ -4731,7 +5148,7 @@
         </p:blipFill>
         <p:spPr>
           <a:xfrm>
-            <a:off x="433772" y="2060849"/>
+            <a:off x="433772" y="1726077"/>
             <a:ext cx="3978697" cy="3647139"/>
           </a:xfrm>
           <a:prstGeom prst="rect">
@@ -4754,7 +5171,7 @@
         </p:blipFill>
         <p:spPr>
           <a:xfrm>
-            <a:off x="4440900" y="2060848"/>
+            <a:off x="4440900" y="1726076"/>
             <a:ext cx="4382776" cy="3647139"/>
           </a:xfrm>
           <a:prstGeom prst="rect">
@@ -4770,7 +5187,7 @@
         </p:nvSpPr>
         <p:spPr>
           <a:xfrm>
-            <a:off x="539552" y="1573913"/>
+            <a:off x="539552" y="1239141"/>
             <a:ext cx="3528392" cy="461665"/>
           </a:xfrm>
           <a:prstGeom prst="rect">
@@ -4804,7 +5221,7 @@
         </p:nvSpPr>
         <p:spPr>
           <a:xfrm>
-            <a:off x="4440900" y="1599183"/>
+            <a:off x="4440900" y="1264411"/>
             <a:ext cx="4382776" cy="461665"/>
           </a:xfrm>
           <a:prstGeom prst="rect">
@@ -4832,6 +5249,56 @@
                 <a:srgbClr val="DD640C"/>
               </a:solidFill>
             </a:endParaRPr>
+          </a:p>
+        </p:txBody>
+      </p:sp>
+      <p:sp>
+        <p:nvSpPr>
+          <p:cNvPr id="3" name="Textfeld 2"/>
+          <p:cNvSpPr txBox="1"/>
+          <p:nvPr/>
+        </p:nvSpPr>
+        <p:spPr>
+          <a:xfrm>
+            <a:off x="-108520" y="5661248"/>
+            <a:ext cx="9252520" cy="461665"/>
+          </a:xfrm>
+          <a:prstGeom prst="rect">
+            <a:avLst/>
+          </a:prstGeom>
+          <a:noFill/>
+        </p:spPr>
+        <p:txBody>
+          <a:bodyPr wrap="square" rtlCol="0">
+            <a:spAutoFit/>
+          </a:bodyPr>
+          <a:lstStyle/>
+          <a:p>
+            <a:pPr algn="ctr"/>
+            <a:r>
+              <a:rPr lang="de-DE" dirty="0"/>
+              <a:t>Content </a:t>
+            </a:r>
+            <a:r>
+              <a:rPr lang="de-DE" dirty="0" err="1"/>
+              <a:t>is</a:t>
+            </a:r>
+            <a:r>
+              <a:rPr lang="de-DE" dirty="0"/>
+              <a:t> </a:t>
+            </a:r>
+            <a:r>
+              <a:rPr lang="de-DE" b="1" dirty="0">
+                <a:solidFill>
+                  <a:srgbClr val="DD640C"/>
+                </a:solidFill>
+              </a:rPr>
+              <a:t>live</a:t>
+            </a:r>
+            <a:r>
+              <a:rPr lang="de-DE" dirty="0"/>
+              <a:t>!</a:t>
+            </a:r>
           </a:p>
         </p:txBody>
       </p:sp>
@@ -4850,7 +5317,7 @@
 </file>
 
 <file path=ppt/slides/slide5.xml><?xml version="1.0" encoding="utf-8"?>
-<p:sld xmlns:a="http://schemas.openxmlformats.org/drawingml/2006/main" xmlns:r="http://schemas.openxmlformats.org/officeDocument/2006/relationships" xmlns:p="http://schemas.openxmlformats.org/presentationml/2006/main">
+<p:sld xmlns:a="http://schemas.openxmlformats.org/drawingml/2006/main" xmlns:r="http://schemas.openxmlformats.org/officeDocument/2006/relationships" xmlns:p="http://schemas.openxmlformats.org/presentationml/2006/main" show="0">
   <p:cSld>
     <p:spTree>
       <p:nvGrpSpPr>
@@ -5011,7 +5478,7 @@
         </p:nvSpPr>
         <p:spPr bwMode="auto">
           <a:xfrm rot="11141214">
-            <a:off x="243364" y="2656610"/>
+            <a:off x="2837370" y="2296570"/>
             <a:ext cx="3423905" cy="2408879"/>
           </a:xfrm>
           <a:prstGeom prst="cloud">
@@ -5071,239 +5538,9 @@
           </a:p>
         </p:txBody>
       </p:sp>
-      <p:sp>
-        <p:nvSpPr>
-          <p:cNvPr id="2" name="Titel 1"/>
-          <p:cNvSpPr>
-            <a:spLocks noGrp="1"/>
-          </p:cNvSpPr>
-          <p:nvPr>
-            <p:ph type="title"/>
-          </p:nvPr>
-        </p:nvSpPr>
-        <p:spPr>
-          <a:xfrm>
-            <a:off x="649796" y="498763"/>
-            <a:ext cx="7772400" cy="685800"/>
-          </a:xfrm>
-        </p:spPr>
-        <p:txBody>
-          <a:bodyPr/>
-          <a:lstStyle/>
-          <a:p>
-            <a:r>
-              <a:rPr lang="de-DE" dirty="0"/>
-              <a:t>Implementation</a:t>
-            </a:r>
-          </a:p>
-        </p:txBody>
-      </p:sp>
-      <p:sp>
-        <p:nvSpPr>
-          <p:cNvPr id="4" name="Foliennummernplatzhalter 3"/>
-          <p:cNvSpPr>
-            <a:spLocks noGrp="1"/>
-          </p:cNvSpPr>
-          <p:nvPr>
-            <p:ph type="sldNum" sz="quarter" idx="10"/>
-          </p:nvPr>
-        </p:nvSpPr>
-        <p:spPr/>
-        <p:txBody>
-          <a:bodyPr/>
-          <a:lstStyle/>
-          <a:p>
-            <a:fld id="{4250A63D-4A51-124D-AE04-51FC091C67D5}" type="slidenum">
-              <a:rPr lang="en-US" smtClean="0"/>
-              <a:pPr/>
-              <a:t>6</a:t>
-            </a:fld>
-            <a:endParaRPr lang="en-US"/>
-          </a:p>
-        </p:txBody>
-      </p:sp>
-      <p:sp>
-        <p:nvSpPr>
-          <p:cNvPr id="5" name="Datumsplatzhalter 4"/>
-          <p:cNvSpPr>
-            <a:spLocks noGrp="1"/>
-          </p:cNvSpPr>
-          <p:nvPr>
-            <p:ph type="dt" sz="half" idx="2"/>
-          </p:nvPr>
-        </p:nvSpPr>
-        <p:spPr>
-          <a:xfrm>
-            <a:off x="0" y="6559003"/>
-            <a:ext cx="7524328" cy="293477"/>
-          </a:xfrm>
-        </p:spPr>
-        <p:txBody>
-          <a:bodyPr/>
-          <a:lstStyle/>
-          <a:p>
-            <a:r>
-              <a:rPr lang="de-DE" dirty="0" err="1"/>
-              <a:t>Continuous</a:t>
-            </a:r>
-            <a:r>
-              <a:rPr lang="de-DE" dirty="0"/>
-              <a:t> Code Reviews, Tobias Dürschmid  </a:t>
-            </a:r>
-            <a:endParaRPr lang="en-US" dirty="0"/>
-          </a:p>
-        </p:txBody>
-      </p:sp>
-      <p:sp>
-        <p:nvSpPr>
-          <p:cNvPr id="8" name="Inhaltsplatzhalter 7"/>
-          <p:cNvSpPr>
-            <a:spLocks noGrp="1"/>
-          </p:cNvSpPr>
-          <p:nvPr>
-            <p:ph idx="1"/>
-          </p:nvPr>
-        </p:nvSpPr>
-        <p:spPr>
-          <a:xfrm>
-            <a:off x="685800" y="1274763"/>
-            <a:ext cx="7772400" cy="5257800"/>
-          </a:xfrm>
-        </p:spPr>
-        <p:txBody>
-          <a:bodyPr/>
-          <a:lstStyle/>
-          <a:p>
-            <a:pPr>
-              <a:buFontTx/>
-              <a:buChar char="-"/>
-            </a:pPr>
-            <a:r>
-              <a:rPr lang="en-US" b="1" dirty="0">
-                <a:solidFill>
-                  <a:srgbClr val="DD640C"/>
-                </a:solidFill>
-              </a:rPr>
-              <a:t>Client-Server Architecture</a:t>
-            </a:r>
-            <a:r>
-              <a:rPr lang="en-US" b="1" dirty="0"/>
-              <a:t> </a:t>
-            </a:r>
-            <a:r>
-              <a:rPr lang="en-US" dirty="0"/>
-              <a:t>with Squeak frontend and ruby server for comment exchange</a:t>
-            </a:r>
-          </a:p>
-          <a:p>
-            <a:pPr>
-              <a:buFontTx/>
-              <a:buChar char="-"/>
-            </a:pPr>
-            <a:endParaRPr lang="en-US" dirty="0"/>
-          </a:p>
-          <a:p>
-            <a:pPr>
-              <a:buFontTx/>
-              <a:buChar char="-"/>
-            </a:pPr>
-            <a:endParaRPr lang="en-US" dirty="0"/>
-          </a:p>
-          <a:p>
-            <a:pPr>
-              <a:buFontTx/>
-              <a:buChar char="-"/>
-            </a:pPr>
-            <a:endParaRPr lang="en-US" dirty="0"/>
-          </a:p>
-          <a:p>
-            <a:pPr>
-              <a:buFontTx/>
-              <a:buChar char="-"/>
-            </a:pPr>
-            <a:endParaRPr lang="en-US" dirty="0"/>
-          </a:p>
-          <a:p>
-            <a:pPr>
-              <a:buFontTx/>
-              <a:buChar char="-"/>
-            </a:pPr>
-            <a:endParaRPr lang="en-US" dirty="0"/>
-          </a:p>
-        </p:txBody>
-      </p:sp>
-      <p:sp>
-        <p:nvSpPr>
-          <p:cNvPr id="3" name="Zylinder 2"/>
-          <p:cNvSpPr/>
-          <p:nvPr/>
-        </p:nvSpPr>
-        <p:spPr bwMode="auto">
-          <a:xfrm>
-            <a:off x="1113898" y="3166650"/>
-            <a:ext cx="1728192" cy="1397143"/>
-          </a:xfrm>
-          <a:prstGeom prst="can">
-            <a:avLst/>
-          </a:prstGeom>
-          <a:solidFill>
-            <a:srgbClr val="DD640C"/>
-          </a:solidFill>
-          <a:ln w="9525" cap="flat" cmpd="sng" algn="ctr">
-            <a:noFill/>
-            <a:prstDash val="solid"/>
-            <a:round/>
-            <a:headEnd type="none" w="med" len="med"/>
-            <a:tailEnd type="none" w="med" len="med"/>
-          </a:ln>
-          <a:effectLst/>
-        </p:spPr>
-        <p:txBody>
-          <a:bodyPr rot="0" spcFirstLastPara="0" vertOverflow="overflow" horzOverflow="overflow" vert="horz" wrap="square" lIns="91440" tIns="45720" rIns="91440" bIns="45720" numCol="1" spcCol="0" rtlCol="0" fromWordArt="0" anchor="ctr" anchorCtr="0" forceAA="0" compatLnSpc="1">
-            <a:prstTxWarp prst="textNoShape">
-              <a:avLst/>
-            </a:prstTxWarp>
-            <a:noAutofit/>
-          </a:bodyPr>
-          <a:lstStyle/>
-          <a:p>
-            <a:pPr marL="0" marR="0" indent="0" algn="ctr" defTabSz="914400" rtl="0" eaLnBrk="0" fontAlgn="base" latinLnBrk="0" hangingPunct="0">
-              <a:lnSpc>
-                <a:spcPct val="100000"/>
-              </a:lnSpc>
-              <a:spcBef>
-                <a:spcPct val="0"/>
-              </a:spcBef>
-              <a:spcAft>
-                <a:spcPct val="0"/>
-              </a:spcAft>
-              <a:buClrTx/>
-              <a:buSzTx/>
-              <a:buFontTx/>
-              <a:buNone/>
-              <a:tabLst/>
-            </a:pPr>
-            <a:r>
-              <a:rPr kumimoji="0" lang="de-DE" sz="2400" b="0" i="0" u="none" strike="noStrike" cap="none" normalizeH="0" baseline="0" dirty="0">
-                <a:ln>
-                  <a:noFill/>
-                </a:ln>
-                <a:solidFill>
-                  <a:schemeClr val="bg1"/>
-                </a:solidFill>
-                <a:effectLst/>
-                <a:latin typeface="Arial" charset="0"/>
-                <a:ea typeface="Osaka" charset="-128"/>
-                <a:cs typeface="Osaka" charset="-128"/>
-              </a:rPr>
-              <a:t>Comments</a:t>
-            </a:r>
-          </a:p>
-        </p:txBody>
-      </p:sp>
       <p:cxnSp>
         <p:nvCxnSpPr>
-          <p:cNvPr id="10" name="Gerade Verbindung mit Pfeil 9"/>
+          <p:cNvPr id="16" name="Gerade Verbindung mit Pfeil 15"/>
           <p:cNvCxnSpPr>
             <a:cxnSpLocks/>
           </p:cNvCxnSpPr>
@@ -5311,8 +5548,8 @@
         </p:nvCxnSpPr>
         <p:spPr bwMode="auto">
           <a:xfrm flipH="1">
-            <a:off x="2842090" y="3454682"/>
-            <a:ext cx="4608512" cy="0"/>
+            <a:off x="2051720" y="3183982"/>
+            <a:ext cx="2253208" cy="0"/>
           </a:xfrm>
           <a:prstGeom prst="straightConnector1">
             <a:avLst/>
@@ -5342,45 +5579,345 @@
       </p:cxnSp>
       <p:sp>
         <p:nvSpPr>
-          <p:cNvPr id="11" name="Rechteck 10"/>
+          <p:cNvPr id="8" name="Inhaltsplatzhalter 7"/>
+          <p:cNvSpPr>
+            <a:spLocks noGrp="1"/>
+          </p:cNvSpPr>
+          <p:nvPr>
+            <p:ph idx="1"/>
+          </p:nvPr>
+        </p:nvSpPr>
+        <p:spPr>
+          <a:xfrm>
+            <a:off x="685800" y="1274763"/>
+            <a:ext cx="7772400" cy="5257800"/>
+          </a:xfrm>
+        </p:spPr>
+        <p:txBody>
+          <a:bodyPr/>
+          <a:lstStyle/>
+          <a:p>
+            <a:pPr marL="0" indent="0">
+              <a:lnSpc>
+                <a:spcPct val="150000"/>
+              </a:lnSpc>
+              <a:buNone/>
+            </a:pPr>
+            <a:r>
+              <a:rPr lang="en-US" dirty="0"/>
+              <a:t>How to exchange comments between clients?</a:t>
+            </a:r>
+          </a:p>
+          <a:p>
+            <a:pPr>
+              <a:lnSpc>
+                <a:spcPct val="150000"/>
+              </a:lnSpc>
+              <a:buFontTx/>
+              <a:buChar char="-"/>
+            </a:pPr>
+            <a:endParaRPr lang="en-US" b="1" dirty="0">
+              <a:solidFill>
+                <a:srgbClr val="DD640C"/>
+              </a:solidFill>
+            </a:endParaRPr>
+          </a:p>
+          <a:p>
+            <a:pPr>
+              <a:lnSpc>
+                <a:spcPct val="150000"/>
+              </a:lnSpc>
+              <a:buFontTx/>
+              <a:buChar char="-"/>
+            </a:pPr>
+            <a:endParaRPr lang="en-US" b="1" dirty="0">
+              <a:solidFill>
+                <a:srgbClr val="DD640C"/>
+              </a:solidFill>
+            </a:endParaRPr>
+          </a:p>
+          <a:p>
+            <a:pPr>
+              <a:lnSpc>
+                <a:spcPct val="150000"/>
+              </a:lnSpc>
+              <a:buFontTx/>
+              <a:buChar char="-"/>
+            </a:pPr>
+            <a:endParaRPr lang="en-US" b="1" dirty="0">
+              <a:solidFill>
+                <a:srgbClr val="DD640C"/>
+              </a:solidFill>
+            </a:endParaRPr>
+          </a:p>
+          <a:p>
+            <a:pPr>
+              <a:lnSpc>
+                <a:spcPct val="150000"/>
+              </a:lnSpc>
+              <a:buFontTx/>
+              <a:buChar char="-"/>
+            </a:pPr>
+            <a:endParaRPr lang="en-US" b="1" dirty="0">
+              <a:solidFill>
+                <a:srgbClr val="DD640C"/>
+              </a:solidFill>
+            </a:endParaRPr>
+          </a:p>
+          <a:p>
+            <a:pPr>
+              <a:lnSpc>
+                <a:spcPct val="150000"/>
+              </a:lnSpc>
+              <a:buFontTx/>
+              <a:buChar char="-"/>
+            </a:pPr>
+            <a:endParaRPr lang="en-US" b="1" dirty="0">
+              <a:solidFill>
+                <a:srgbClr val="DD640C"/>
+              </a:solidFill>
+            </a:endParaRPr>
+          </a:p>
+          <a:p>
+            <a:pPr marL="0" indent="0">
+              <a:lnSpc>
+                <a:spcPct val="150000"/>
+              </a:lnSpc>
+              <a:buNone/>
+            </a:pPr>
+            <a:r>
+              <a:rPr lang="en-US" b="1" dirty="0">
+                <a:solidFill>
+                  <a:srgbClr val="DD640C"/>
+                </a:solidFill>
+              </a:rPr>
+              <a:t>Client-Server Architecture</a:t>
+            </a:r>
+            <a:r>
+              <a:rPr lang="en-US" b="1" dirty="0"/>
+              <a:t> </a:t>
+            </a:r>
+            <a:r>
+              <a:rPr lang="en-US" dirty="0"/>
+              <a:t>with Squeak frontend and Ruby server for comment exchange using REST</a:t>
+            </a:r>
+          </a:p>
+          <a:p>
+            <a:pPr>
+              <a:lnSpc>
+                <a:spcPct val="150000"/>
+              </a:lnSpc>
+              <a:buFontTx/>
+              <a:buChar char="-"/>
+            </a:pPr>
+            <a:endParaRPr lang="en-US" dirty="0"/>
+          </a:p>
+          <a:p>
+            <a:pPr>
+              <a:lnSpc>
+                <a:spcPct val="150000"/>
+              </a:lnSpc>
+              <a:buFontTx/>
+              <a:buChar char="-"/>
+            </a:pPr>
+            <a:endParaRPr lang="en-US" dirty="0"/>
+          </a:p>
+          <a:p>
+            <a:pPr>
+              <a:lnSpc>
+                <a:spcPct val="150000"/>
+              </a:lnSpc>
+              <a:buFontTx/>
+              <a:buChar char="-"/>
+            </a:pPr>
+            <a:endParaRPr lang="en-US" dirty="0"/>
+          </a:p>
+          <a:p>
+            <a:pPr>
+              <a:lnSpc>
+                <a:spcPct val="150000"/>
+              </a:lnSpc>
+              <a:buFontTx/>
+              <a:buChar char="-"/>
+            </a:pPr>
+            <a:endParaRPr lang="en-US" dirty="0"/>
+          </a:p>
+          <a:p>
+            <a:pPr>
+              <a:lnSpc>
+                <a:spcPct val="150000"/>
+              </a:lnSpc>
+              <a:buFontTx/>
+              <a:buChar char="-"/>
+            </a:pPr>
+            <a:endParaRPr lang="en-US" dirty="0"/>
+          </a:p>
+        </p:txBody>
+      </p:sp>
+      <p:sp>
+        <p:nvSpPr>
+          <p:cNvPr id="2" name="Titel 1"/>
+          <p:cNvSpPr>
+            <a:spLocks noGrp="1"/>
+          </p:cNvSpPr>
+          <p:nvPr>
+            <p:ph type="title"/>
+          </p:nvPr>
+        </p:nvSpPr>
+        <p:spPr>
+          <a:xfrm>
+            <a:off x="649796" y="498763"/>
+            <a:ext cx="7772400" cy="685800"/>
+          </a:xfrm>
+        </p:spPr>
+        <p:txBody>
+          <a:bodyPr/>
+          <a:lstStyle/>
+          <a:p>
+            <a:r>
+              <a:rPr lang="de-DE" dirty="0"/>
+              <a:t>Design</a:t>
+            </a:r>
+          </a:p>
+        </p:txBody>
+      </p:sp>
+      <p:sp>
+        <p:nvSpPr>
+          <p:cNvPr id="4" name="Foliennummernplatzhalter 3"/>
+          <p:cNvSpPr>
+            <a:spLocks noGrp="1"/>
+          </p:cNvSpPr>
+          <p:nvPr>
+            <p:ph type="sldNum" sz="quarter" idx="10"/>
+          </p:nvPr>
+        </p:nvSpPr>
+        <p:spPr/>
+        <p:txBody>
+          <a:bodyPr/>
+          <a:lstStyle/>
+          <a:p>
+            <a:fld id="{4250A63D-4A51-124D-AE04-51FC091C67D5}" type="slidenum">
+              <a:rPr lang="en-US" smtClean="0"/>
+              <a:pPr/>
+              <a:t>6</a:t>
+            </a:fld>
+            <a:endParaRPr lang="en-US"/>
+          </a:p>
+        </p:txBody>
+      </p:sp>
+      <p:sp>
+        <p:nvSpPr>
+          <p:cNvPr id="5" name="Datumsplatzhalter 4"/>
+          <p:cNvSpPr>
+            <a:spLocks noGrp="1"/>
+          </p:cNvSpPr>
+          <p:nvPr>
+            <p:ph type="dt" sz="half" idx="2"/>
+          </p:nvPr>
+        </p:nvSpPr>
+        <p:spPr>
+          <a:xfrm>
+            <a:off x="0" y="6559003"/>
+            <a:ext cx="7524328" cy="293477"/>
+          </a:xfrm>
+        </p:spPr>
+        <p:txBody>
+          <a:bodyPr/>
+          <a:lstStyle/>
+          <a:p>
+            <a:r>
+              <a:rPr lang="de-DE" dirty="0" err="1"/>
+              <a:t>Continuous</a:t>
+            </a:r>
+            <a:r>
+              <a:rPr lang="de-DE" dirty="0"/>
+              <a:t> Code Reviews, Tobias Dürschmid  </a:t>
+            </a:r>
+            <a:endParaRPr lang="en-US" dirty="0"/>
+          </a:p>
+        </p:txBody>
+      </p:sp>
+      <p:sp>
+        <p:nvSpPr>
+          <p:cNvPr id="3" name="Zylinder 2"/>
           <p:cNvSpPr/>
           <p:nvPr/>
         </p:nvSpPr>
-        <p:spPr>
+        <p:spPr bwMode="auto">
           <a:xfrm>
-            <a:off x="3879075" y="2993017"/>
-            <a:ext cx="2462534" cy="461665"/>
+            <a:off x="3685226" y="2806610"/>
+            <a:ext cx="1728192" cy="1397143"/>
           </a:xfrm>
-          <a:prstGeom prst="rect">
+          <a:prstGeom prst="can">
             <a:avLst/>
           </a:prstGeom>
+          <a:solidFill>
+            <a:srgbClr val="DD640C"/>
+          </a:solidFill>
+          <a:ln w="9525" cap="flat" cmpd="sng" algn="ctr">
+            <a:noFill/>
+            <a:prstDash val="solid"/>
+            <a:round/>
+            <a:headEnd type="none" w="med" len="med"/>
+            <a:tailEnd type="none" w="med" len="med"/>
+          </a:ln>
+          <a:effectLst/>
         </p:spPr>
         <p:txBody>
-          <a:bodyPr wrap="none">
-            <a:spAutoFit/>
+          <a:bodyPr rot="0" spcFirstLastPara="0" vertOverflow="overflow" horzOverflow="overflow" vert="horz" wrap="square" lIns="91440" tIns="45720" rIns="91440" bIns="45720" numCol="1" spcCol="0" rtlCol="0" fromWordArt="0" anchor="ctr" anchorCtr="0" forceAA="0" compatLnSpc="1">
+            <a:prstTxWarp prst="textNoShape">
+              <a:avLst/>
+            </a:prstTxWarp>
+            <a:noAutofit/>
           </a:bodyPr>
           <a:lstStyle/>
           <a:p>
-            <a:r>
-              <a:rPr lang="en-US" dirty="0"/>
-              <a:t>Comment added</a:t>
-            </a:r>
-            <a:endParaRPr lang="de-DE" dirty="0"/>
+            <a:pPr marL="0" marR="0" indent="0" algn="ctr" defTabSz="914400" rtl="0" eaLnBrk="0" fontAlgn="base" latinLnBrk="0" hangingPunct="0">
+              <a:lnSpc>
+                <a:spcPct val="100000"/>
+              </a:lnSpc>
+              <a:spcBef>
+                <a:spcPct val="0"/>
+              </a:spcBef>
+              <a:spcAft>
+                <a:spcPct val="0"/>
+              </a:spcAft>
+              <a:buClrTx/>
+              <a:buSzTx/>
+              <a:buFontTx/>
+              <a:buNone/>
+              <a:tabLst/>
+            </a:pPr>
+            <a:r>
+              <a:rPr kumimoji="0" lang="de-DE" sz="2400" b="0" i="0" u="none" strike="noStrike" cap="none" normalizeH="0" baseline="0" dirty="0">
+                <a:ln>
+                  <a:noFill/>
+                </a:ln>
+                <a:solidFill>
+                  <a:schemeClr val="bg1"/>
+                </a:solidFill>
+                <a:effectLst/>
+                <a:latin typeface="Arial" charset="0"/>
+                <a:ea typeface="Osaka" charset="-128"/>
+                <a:cs typeface="Osaka" charset="-128"/>
+              </a:rPr>
+              <a:t>Comments</a:t>
+            </a:r>
           </a:p>
         </p:txBody>
       </p:sp>
       <p:cxnSp>
         <p:nvCxnSpPr>
-          <p:cNvPr id="12" name="Gerade Verbindung mit Pfeil 11"/>
+          <p:cNvPr id="10" name="Gerade Verbindung mit Pfeil 9"/>
           <p:cNvCxnSpPr>
             <a:cxnSpLocks/>
           </p:cNvCxnSpPr>
           <p:nvPr/>
         </p:nvCxnSpPr>
         <p:spPr bwMode="auto">
-          <a:xfrm>
-            <a:off x="2842090" y="4256374"/>
-            <a:ext cx="4248472" cy="23821"/>
+          <a:xfrm flipH="1">
+            <a:off x="5413418" y="3094642"/>
+            <a:ext cx="2253208" cy="0"/>
           </a:xfrm>
           <a:prstGeom prst="straightConnector1">
             <a:avLst/>
@@ -5408,44 +5945,162 @@
           </a:fontRef>
         </p:style>
       </p:cxnSp>
-      <p:sp>
-        <p:nvSpPr>
-          <p:cNvPr id="15" name="Rechteck 14"/>
+      <p:cxnSp>
+        <p:nvCxnSpPr>
+          <p:cNvPr id="12" name="Gerade Verbindung mit Pfeil 11"/>
+          <p:cNvCxnSpPr>
+            <a:cxnSpLocks/>
+          </p:cNvCxnSpPr>
+          <p:nvPr/>
+        </p:nvCxnSpPr>
+        <p:spPr bwMode="auto">
+          <a:xfrm flipV="1">
+            <a:off x="5148064" y="3920155"/>
+            <a:ext cx="1893168" cy="13489"/>
+          </a:xfrm>
+          <a:prstGeom prst="straightConnector1">
+            <a:avLst/>
+          </a:prstGeom>
+          <a:ln w="76200">
+            <a:solidFill>
+              <a:srgbClr val="DD640C"/>
+            </a:solidFill>
+            <a:headEnd type="none" w="med" len="med"/>
+            <a:tailEnd type="triangle"/>
+          </a:ln>
+        </p:spPr>
+        <p:style>
+          <a:lnRef idx="3">
+            <a:schemeClr val="accent3"/>
+          </a:lnRef>
+          <a:fillRef idx="0">
+            <a:schemeClr val="accent3"/>
+          </a:fillRef>
+          <a:effectRef idx="2">
+            <a:schemeClr val="accent3"/>
+          </a:effectRef>
+          <a:fontRef idx="minor">
+            <a:schemeClr val="tx1"/>
+          </a:fontRef>
+        </p:style>
+      </p:cxnSp>
+      <p:sp>
+        <p:nvSpPr>
+          <p:cNvPr id="7" name="Rechteck 6"/>
           <p:cNvSpPr/>
           <p:nvPr/>
         </p:nvSpPr>
-        <p:spPr>
+        <p:spPr bwMode="auto">
           <a:xfrm>
-            <a:off x="3879075" y="4263482"/>
-            <a:ext cx="2462534" cy="461665"/>
+            <a:off x="7020272" y="2835601"/>
+            <a:ext cx="1653480" cy="1368152"/>
           </a:xfrm>
           <a:prstGeom prst="rect">
             <a:avLst/>
           </a:prstGeom>
+          <a:solidFill>
+            <a:srgbClr val="DD640C"/>
+          </a:solidFill>
+          <a:ln w="9525" cap="flat" cmpd="sng" algn="ctr">
+            <a:noFill/>
+            <a:prstDash val="solid"/>
+            <a:round/>
+            <a:headEnd type="none" w="med" len="med"/>
+            <a:tailEnd type="none" w="med" len="med"/>
+          </a:ln>
+          <a:effectLst/>
         </p:spPr>
         <p:txBody>
-          <a:bodyPr wrap="none">
-            <a:spAutoFit/>
+          <a:bodyPr rot="0" spcFirstLastPara="0" vertOverflow="overflow" horzOverflow="overflow" vert="horz" wrap="square" lIns="91440" tIns="45720" rIns="91440" bIns="45720" numCol="1" spcCol="0" rtlCol="0" fromWordArt="0" anchor="ctr" anchorCtr="0" forceAA="0" compatLnSpc="1">
+            <a:prstTxWarp prst="textNoShape">
+              <a:avLst/>
+            </a:prstTxWarp>
+            <a:noAutofit/>
           </a:bodyPr>
           <a:lstStyle/>
           <a:p>
-            <a:r>
-              <a:rPr lang="en-US" dirty="0"/>
-              <a:t>Comment added</a:t>
-            </a:r>
-            <a:endParaRPr lang="de-DE" dirty="0"/>
-          </a:p>
-        </p:txBody>
-      </p:sp>
-      <p:sp>
-        <p:nvSpPr>
-          <p:cNvPr id="7" name="Rechteck 6"/>
+            <a:pPr marL="0" marR="0" indent="0" algn="ctr" defTabSz="914400" rtl="0" eaLnBrk="0" fontAlgn="base" latinLnBrk="0" hangingPunct="0">
+              <a:lnSpc>
+                <a:spcPct val="100000"/>
+              </a:lnSpc>
+              <a:spcBef>
+                <a:spcPct val="0"/>
+              </a:spcBef>
+              <a:spcAft>
+                <a:spcPct val="0"/>
+              </a:spcAft>
+              <a:buClrTx/>
+              <a:buSzTx/>
+              <a:buFontTx/>
+              <a:buNone/>
+              <a:tabLst/>
+            </a:pPr>
+            <a:r>
+              <a:rPr kumimoji="0" lang="de-DE" sz="2400" b="0" i="0" u="none" strike="noStrike" cap="none" normalizeH="0" baseline="0" dirty="0">
+                <a:ln>
+                  <a:noFill/>
+                </a:ln>
+                <a:solidFill>
+                  <a:schemeClr val="bg1"/>
+                </a:solidFill>
+                <a:effectLst/>
+                <a:latin typeface="Arial" charset="0"/>
+                <a:ea typeface="Osaka" charset="-128"/>
+                <a:cs typeface="Osaka" charset="-128"/>
+              </a:rPr>
+              <a:t>IDE</a:t>
+            </a:r>
+          </a:p>
+        </p:txBody>
+      </p:sp>
+      <p:cxnSp>
+        <p:nvCxnSpPr>
+          <p:cNvPr id="17" name="Gerade Verbindung mit Pfeil 16"/>
+          <p:cNvCxnSpPr>
+            <a:cxnSpLocks/>
+          </p:cNvCxnSpPr>
+          <p:nvPr/>
+        </p:nvCxnSpPr>
+        <p:spPr bwMode="auto">
+          <a:xfrm flipV="1">
+            <a:off x="1814736" y="4009495"/>
+            <a:ext cx="1893168" cy="13489"/>
+          </a:xfrm>
+          <a:prstGeom prst="straightConnector1">
+            <a:avLst/>
+          </a:prstGeom>
+          <a:ln w="76200">
+            <a:solidFill>
+              <a:srgbClr val="DD640C"/>
+            </a:solidFill>
+            <a:headEnd type="none" w="med" len="med"/>
+            <a:tailEnd type="triangle"/>
+          </a:ln>
+        </p:spPr>
+        <p:style>
+          <a:lnRef idx="3">
+            <a:schemeClr val="accent3"/>
+          </a:lnRef>
+          <a:fillRef idx="0">
+            <a:schemeClr val="accent3"/>
+          </a:fillRef>
+          <a:effectRef idx="2">
+            <a:schemeClr val="accent3"/>
+          </a:effectRef>
+          <a:fontRef idx="minor">
+            <a:schemeClr val="tx1"/>
+          </a:fontRef>
+        </p:style>
+      </p:cxnSp>
+      <p:sp>
+        <p:nvSpPr>
+          <p:cNvPr id="18" name="Rechteck 17"/>
           <p:cNvSpPr/>
           <p:nvPr/>
         </p:nvSpPr>
         <p:spPr bwMode="auto">
           <a:xfrm>
-            <a:off x="7094984" y="3195641"/>
+            <a:off x="398240" y="2852936"/>
             <a:ext cx="1653480" cy="1368152"/>
           </a:xfrm>
           <a:prstGeom prst="rect">
@@ -5559,7 +6214,7 @@
           <a:p>
             <a:r>
               <a:rPr lang="en-US" dirty="0"/>
-              <a:t>Implementation</a:t>
+              <a:t>Design</a:t>
             </a:r>
           </a:p>
         </p:txBody>
@@ -5640,13 +6295,15 @@
           <a:bodyPr/>
           <a:lstStyle/>
           <a:p>
-            <a:pPr>
-              <a:buFontTx/>
-              <a:buChar char="-"/>
+            <a:pPr marL="0" indent="0">
+              <a:lnSpc>
+                <a:spcPct val="150000"/>
+              </a:lnSpc>
+              <a:buNone/>
             </a:pPr>
             <a:r>
               <a:rPr lang="en-US" dirty="0"/>
-              <a:t>Each comment </a:t>
+              <a:t>How to encode the </a:t>
             </a:r>
             <a:r>
               <a:rPr lang="en-US" b="1" dirty="0">
@@ -5654,34 +6311,90 @@
                   <a:srgbClr val="DD640C"/>
                 </a:solidFill>
               </a:rPr>
-              <a:t>references a meta object</a:t>
+              <a:t>reference to meta objects</a:t>
             </a:r>
             <a:r>
               <a:rPr lang="en-US" dirty="0"/>
-              <a:t> via hash</a:t>
-            </a:r>
-          </a:p>
-          <a:p>
-            <a:pPr lvl="1">
-              <a:buFontTx/>
-              <a:buChar char="-"/>
+              <a:t>?</a:t>
+            </a:r>
+          </a:p>
+          <a:p>
+            <a:pPr marL="0" indent="0">
+              <a:lnSpc>
+                <a:spcPct val="150000"/>
+              </a:lnSpc>
+              <a:buNone/>
             </a:pPr>
-            <a:r>
-              <a:rPr lang="en-US" sz="2200" dirty="0"/>
+            <a:endParaRPr lang="en-US" dirty="0"/>
+          </a:p>
+          <a:p>
+            <a:pPr marL="0" indent="0">
+              <a:lnSpc>
+                <a:spcPct val="150000"/>
+              </a:lnSpc>
+              <a:buNone/>
+            </a:pPr>
+            <a:endParaRPr lang="en-US" dirty="0"/>
+          </a:p>
+          <a:p>
+            <a:pPr marL="0" indent="0">
+              <a:lnSpc>
+                <a:spcPct val="150000"/>
+              </a:lnSpc>
+              <a:buNone/>
+            </a:pPr>
+            <a:endParaRPr lang="en-US" sz="1800" dirty="0"/>
+          </a:p>
+          <a:p>
+            <a:pPr marL="0" indent="0">
+              <a:lnSpc>
+                <a:spcPct val="150000"/>
+              </a:lnSpc>
+              <a:buNone/>
+            </a:pPr>
+            <a:endParaRPr lang="en-US" sz="1800" dirty="0"/>
+          </a:p>
+          <a:p>
+            <a:pPr marL="0" indent="0">
+              <a:lnSpc>
+                <a:spcPct val="150000"/>
+              </a:lnSpc>
+              <a:buNone/>
+            </a:pPr>
+            <a:r>
+              <a:rPr lang="en-US" sz="1800" dirty="0"/>
+              <a:t> </a:t>
+            </a:r>
+            <a:r>
+              <a:rPr lang="en-US" dirty="0"/>
+              <a:t> </a:t>
+            </a:r>
+          </a:p>
+          <a:p>
+            <a:pPr marL="0" indent="0">
+              <a:lnSpc>
+                <a:spcPct val="150000"/>
+              </a:lnSpc>
+              <a:buNone/>
+            </a:pPr>
+            <a:r>
+              <a:rPr lang="en-US" dirty="0"/>
               <a:t>Package: Package name</a:t>
             </a:r>
           </a:p>
           <a:p>
-            <a:pPr lvl="1">
-              <a:buFontTx/>
-              <a:buChar char="-"/>
+            <a:pPr marL="0" indent="0">
+              <a:lnSpc>
+                <a:spcPct val="150000"/>
+              </a:lnSpc>
+              <a:buNone/>
             </a:pPr>
             <a:r>
-              <a:rPr lang="en-US" sz="2200" dirty="0"/>
+              <a:rPr lang="en-US" dirty="0"/>
               <a:t>Class: </a:t>
             </a:r>
             <a:r>
-              <a:rPr lang="en-US" sz="2200" dirty="0">
+              <a:rPr lang="en-US" dirty="0">
                 <a:solidFill>
                   <a:schemeClr val="bg1">
                     <a:lumMod val="50000"/>
@@ -5691,21 +6404,23 @@
               <a:t>Package name + </a:t>
             </a:r>
             <a:r>
-              <a:rPr lang="en-US" sz="2200" dirty="0"/>
+              <a:rPr lang="en-US" dirty="0"/>
               <a:t>class name</a:t>
             </a:r>
           </a:p>
           <a:p>
-            <a:pPr lvl="1">
-              <a:buFontTx/>
-              <a:buChar char="-"/>
+            <a:pPr marL="0" indent="0">
+              <a:lnSpc>
+                <a:spcPct val="150000"/>
+              </a:lnSpc>
+              <a:buNone/>
             </a:pPr>
             <a:r>
-              <a:rPr lang="en-US" sz="2200" dirty="0"/>
+              <a:rPr lang="en-US" dirty="0"/>
               <a:t>Method: </a:t>
             </a:r>
             <a:r>
-              <a:rPr lang="en-US" sz="2200" dirty="0">
+              <a:rPr lang="en-US" dirty="0">
                 <a:solidFill>
                   <a:schemeClr val="bg1">
                     <a:lumMod val="50000"/>
@@ -5715,32 +6430,34 @@
               <a:t>Package name + </a:t>
             </a:r>
             <a:r>
-              <a:rPr lang="en-US" sz="2200" dirty="0"/>
-              <a:t>class name + method</a:t>
-            </a:r>
-            <a:r>
-              <a:rPr lang="en-US" sz="2400" dirty="0"/>
-              <a:t> name</a:t>
-            </a:r>
-          </a:p>
-          <a:p>
-            <a:pPr>
-              <a:buFontTx/>
-              <a:buChar char="-"/>
+              <a:rPr lang="en-US" dirty="0"/>
+              <a:t>class name + method name</a:t>
+            </a:r>
+          </a:p>
+          <a:p>
+            <a:pPr marL="0" indent="0">
+              <a:lnSpc>
+                <a:spcPct val="150000"/>
+              </a:lnSpc>
+              <a:buNone/>
             </a:pPr>
-            <a:endParaRPr lang="en-US" sz="2800" dirty="0"/>
-          </a:p>
-          <a:p>
-            <a:pPr>
-              <a:buFontTx/>
-              <a:buChar char="-"/>
+            <a:endParaRPr lang="en-US" dirty="0"/>
+          </a:p>
+          <a:p>
+            <a:pPr marL="0" indent="0">
+              <a:lnSpc>
+                <a:spcPct val="150000"/>
+              </a:lnSpc>
+              <a:buNone/>
             </a:pPr>
-            <a:endParaRPr lang="en-US" sz="2800" dirty="0"/>
-          </a:p>
-          <a:p>
-            <a:pPr>
-              <a:buFontTx/>
-              <a:buChar char="-"/>
+            <a:endParaRPr lang="en-US" dirty="0"/>
+          </a:p>
+          <a:p>
+            <a:pPr marL="0" indent="0">
+              <a:lnSpc>
+                <a:spcPct val="150000"/>
+              </a:lnSpc>
+              <a:buNone/>
             </a:pPr>
             <a:endParaRPr lang="en-US" dirty="0"/>
           </a:p>
@@ -5761,8 +6478,8 @@
         </p:blipFill>
         <p:spPr>
           <a:xfrm>
-            <a:off x="815467" y="3169476"/>
-            <a:ext cx="7513066" cy="3067836"/>
+            <a:off x="1258956" y="1947483"/>
+            <a:ext cx="6626088" cy="2705653"/>
           </a:xfrm>
           <a:prstGeom prst="rect">
             <a:avLst/>
@@ -5822,7 +6539,7 @@
           <a:p>
             <a:r>
               <a:rPr lang="de-DE" dirty="0"/>
-              <a:t>Implementation</a:t>
+              <a:t>Design</a:t>
             </a:r>
           </a:p>
         </p:txBody>
@@ -5903,13 +6620,15 @@
           <a:bodyPr/>
           <a:lstStyle/>
           <a:p>
-            <a:pPr>
-              <a:buFontTx/>
-              <a:buChar char="-"/>
+            <a:pPr marL="0" indent="0">
+              <a:lnSpc>
+                <a:spcPct val="150000"/>
+              </a:lnSpc>
+              <a:buNone/>
             </a:pPr>
             <a:r>
               <a:rPr lang="en-US" dirty="0"/>
-              <a:t>Comments are </a:t>
+              <a:t>How to </a:t>
             </a:r>
             <a:r>
               <a:rPr lang="en-US" b="1" dirty="0">
@@ -5917,28 +6636,31 @@
                   <a:srgbClr val="DD640C"/>
                 </a:solidFill>
               </a:rPr>
-              <a:t>migrated</a:t>
+              <a:t>migrate</a:t>
             </a:r>
             <a:r>
               <a:rPr lang="en-US" dirty="0"/>
-              <a:t> when the meta object is moved to another class / package</a:t>
+              <a:t> comments when the meta object </a:t>
+            </a:r>
+            <a:br>
+              <a:rPr lang="en-US" dirty="0"/>
+            </a:br>
+            <a:r>
+              <a:rPr lang="en-US" dirty="0"/>
+              <a:t>is moved to another class / package or renamed?</a:t>
             </a:r>
           </a:p>
           <a:p>
             <a:pPr>
+              <a:lnSpc>
+                <a:spcPct val="150000"/>
+              </a:lnSpc>
               <a:buFontTx/>
               <a:buChar char="-"/>
             </a:pPr>
-            <a:endParaRPr lang="en-US" dirty="0"/>
-          </a:p>
-          <a:p>
-            <a:pPr>
-              <a:buFontTx/>
-              <a:buChar char="-"/>
-            </a:pPr>
             <a:r>
               <a:rPr lang="en-US" dirty="0"/>
-              <a:t>Reset of comments is performed </a:t>
+              <a:t>Comment has a </a:t>
             </a:r>
             <a:r>
               <a:rPr lang="en-US" b="1" dirty="0">
@@ -5946,15 +6668,132 @@
                   <a:srgbClr val="DD640C"/>
                 </a:solidFill>
               </a:rPr>
-              <a:t>explicitly </a:t>
+              <a:t>list of references</a:t>
+            </a:r>
+          </a:p>
+          <a:p>
+            <a:pPr>
+              <a:lnSpc>
+                <a:spcPct val="150000"/>
+              </a:lnSpc>
+              <a:buFontTx/>
+              <a:buChar char="-"/>
+            </a:pPr>
+            <a:endParaRPr lang="en-US" dirty="0"/>
+          </a:p>
+          <a:p>
+            <a:pPr marL="0" indent="0">
+              <a:lnSpc>
+                <a:spcPct val="150000"/>
+              </a:lnSpc>
+              <a:buNone/>
+            </a:pPr>
+            <a:r>
+              <a:rPr lang="en-US" b="1" dirty="0">
+                <a:solidFill>
+                  <a:srgbClr val="DD640C"/>
+                </a:solidFill>
+              </a:rPr>
+              <a:t>When to reset </a:t>
+            </a:r>
+            <a:r>
+              <a:rPr lang="en-US" dirty="0"/>
+              <a:t>comments?</a:t>
+            </a:r>
+          </a:p>
+          <a:p>
+            <a:pPr>
+              <a:lnSpc>
+                <a:spcPct val="150000"/>
+              </a:lnSpc>
+              <a:buFontTx/>
+              <a:buChar char="-"/>
+            </a:pPr>
+            <a:r>
+              <a:rPr lang="en-US" b="1" dirty="0">
+                <a:solidFill>
+                  <a:srgbClr val="DD640C"/>
+                </a:solidFill>
+              </a:rPr>
+              <a:t>Only explicitly </a:t>
             </a:r>
             <a:r>
               <a:rPr lang="en-US" dirty="0"/>
               <a:t>by user only</a:t>
             </a:r>
           </a:p>
-        </p:txBody>
-      </p:sp>
+          <a:p>
+            <a:pPr>
+              <a:lnSpc>
+                <a:spcPct val="150000"/>
+              </a:lnSpc>
+              <a:buFontTx/>
+              <a:buChar char="-"/>
+            </a:pPr>
+            <a:endParaRPr lang="en-US" dirty="0"/>
+          </a:p>
+        </p:txBody>
+      </p:sp>
+      <p:pic>
+        <p:nvPicPr>
+          <p:cNvPr id="11" name="Grafik 10" descr="Benutzer"/>
+          <p:cNvPicPr>
+            <a:picLocks noChangeAspect="1"/>
+          </p:cNvPicPr>
+          <p:nvPr/>
+        </p:nvPicPr>
+        <p:blipFill>
+          <a:blip r:embed="rId3">
+            <a:extLst>
+              <a:ext uri="{96DAC541-7B7A-43D3-8B79-37D633B846F1}">
+                <asvg:svgBlip xmlns:asvg="http://schemas.microsoft.com/office/drawing/2016/SVG/main" r:embed="rId4"/>
+              </a:ext>
+            </a:extLst>
+          </a:blip>
+          <a:stretch>
+            <a:fillRect/>
+          </a:stretch>
+        </p:blipFill>
+        <p:spPr>
+          <a:xfrm>
+            <a:off x="5004048" y="4458816"/>
+            <a:ext cx="914400" cy="914400"/>
+          </a:xfrm>
+          <a:prstGeom prst="rect">
+            <a:avLst/>
+          </a:prstGeom>
+        </p:spPr>
+      </p:pic>
+      <p:pic>
+        <p:nvPicPr>
+          <p:cNvPr id="15" name="Grafik 14" descr="Prüfliste"/>
+          <p:cNvPicPr>
+            <a:picLocks noChangeAspect="1"/>
+          </p:cNvPicPr>
+          <p:nvPr/>
+        </p:nvPicPr>
+        <p:blipFill>
+          <a:blip r:embed="rId5">
+            <a:extLst>
+              <a:ext uri="{96DAC541-7B7A-43D3-8B79-37D633B846F1}">
+                <asvg:svgBlip xmlns:asvg="http://schemas.microsoft.com/office/drawing/2016/SVG/main" r:embed="rId6"/>
+              </a:ext>
+            </a:extLst>
+          </a:blip>
+          <a:stretch>
+            <a:fillRect/>
+          </a:stretch>
+        </p:blipFill>
+        <p:spPr>
+          <a:xfrm>
+            <a:off x="5940152" y="2442592"/>
+            <a:ext cx="914400" cy="914400"/>
+          </a:xfrm>
+          <a:prstGeom prst="rect">
+            <a:avLst/>
+          </a:prstGeom>
+        </p:spPr>
+      </p:pic>
     </p:spTree>
     <p:extLst>
       <p:ext uri="{BB962C8B-B14F-4D97-AF65-F5344CB8AC3E}">
@@ -6094,45 +6933,14 @@
           <a:lstStyle/>
           <a:p>
             <a:pPr>
+              <a:lnSpc>
+                <a:spcPct val="150000"/>
+              </a:lnSpc>
               <a:buFontTx/>
               <a:buChar char="-"/>
             </a:pPr>
             <a:r>
-              <a:rPr lang="en-US" dirty="0"/>
-              <a:t>Tools like </a:t>
-            </a:r>
-            <a:r>
-              <a:rPr lang="en-US" dirty="0" err="1"/>
-              <a:t>CodeFlow</a:t>
-            </a:r>
-            <a:r>
-              <a:rPr lang="en-US" dirty="0"/>
-              <a:t>, Mondrian, </a:t>
-            </a:r>
-            <a:r>
-              <a:rPr lang="en-US" dirty="0" err="1"/>
-              <a:t>Gerrit</a:t>
-            </a:r>
-            <a:r>
-              <a:rPr lang="en-US" dirty="0"/>
-              <a:t>, Phabricator, </a:t>
-            </a:r>
-            <a:r>
-              <a:rPr lang="de-DE" dirty="0" err="1"/>
-              <a:t>ClusterChanges</a:t>
-            </a:r>
-            <a:r>
-              <a:rPr lang="de-DE" dirty="0"/>
-              <a:t> </a:t>
-            </a:r>
-          </a:p>
-          <a:p>
-            <a:pPr lvl="1">
-              <a:buFontTx/>
-              <a:buChar char="-"/>
-            </a:pPr>
-            <a:r>
-              <a:rPr lang="de-DE" sz="2400" dirty="0">
+              <a:rPr lang="de-DE" dirty="0">
                 <a:solidFill>
                   <a:srgbClr val="000000"/>
                 </a:solidFill>
@@ -6140,7 +6948,7 @@
               <a:t>Stand-</a:t>
             </a:r>
             <a:r>
-              <a:rPr lang="de-DE" sz="2400" dirty="0" err="1">
+              <a:rPr lang="de-DE" dirty="0" err="1">
                 <a:solidFill>
                   <a:srgbClr val="000000"/>
                 </a:solidFill>
@@ -6148,7 +6956,7 @@
               <a:t>alone</a:t>
             </a:r>
             <a:r>
-              <a:rPr lang="de-DE" sz="2400" dirty="0">
+              <a:rPr lang="de-DE" dirty="0">
                 <a:solidFill>
                   <a:srgbClr val="000000"/>
                 </a:solidFill>
@@ -6156,7 +6964,7 @@
               <a:t> </a:t>
             </a:r>
             <a:r>
-              <a:rPr lang="de-DE" sz="2400" dirty="0" err="1">
+              <a:rPr lang="de-DE" dirty="0" err="1">
                 <a:solidFill>
                   <a:srgbClr val="000000"/>
                 </a:solidFill>
@@ -6164,7 +6972,7 @@
               <a:t>tools</a:t>
             </a:r>
             <a:r>
-              <a:rPr lang="de-DE" sz="2400" dirty="0">
+              <a:rPr lang="de-DE" dirty="0">
                 <a:solidFill>
                   <a:srgbClr val="000000"/>
                 </a:solidFill>
@@ -6172,7 +6980,7 @@
               <a:t> </a:t>
             </a:r>
             <a:r>
-              <a:rPr lang="de-DE" sz="2400" dirty="0" err="1">
+              <a:rPr lang="de-DE" dirty="0" err="1">
                 <a:solidFill>
                   <a:srgbClr val="000000"/>
                 </a:solidFill>
@@ -6180,7 +6988,7 @@
               <a:t>for</a:t>
             </a:r>
             <a:r>
-              <a:rPr lang="de-DE" sz="2400" dirty="0">
+              <a:rPr lang="de-DE" dirty="0">
                 <a:solidFill>
                   <a:srgbClr val="000000"/>
                 </a:solidFill>
@@ -6188,7 +6996,7 @@
               <a:t> </a:t>
             </a:r>
             <a:r>
-              <a:rPr lang="de-DE" sz="2400" dirty="0" err="1">
+              <a:rPr lang="de-DE" dirty="0" err="1">
                 <a:solidFill>
                   <a:srgbClr val="000000"/>
                 </a:solidFill>
@@ -6196,7 +7004,7 @@
               <a:t>code</a:t>
             </a:r>
             <a:r>
-              <a:rPr lang="de-DE" sz="2400" dirty="0">
+              <a:rPr lang="de-DE" dirty="0">
                 <a:solidFill>
                   <a:srgbClr val="000000"/>
                 </a:solidFill>
@@ -6204,7 +7012,7 @@
               <a:t> </a:t>
             </a:r>
             <a:r>
-              <a:rPr lang="de-DE" sz="2400" dirty="0" err="1">
+              <a:rPr lang="de-DE" dirty="0" err="1">
                 <a:solidFill>
                   <a:srgbClr val="000000"/>
                 </a:solidFill>
@@ -6212,7 +7020,7 @@
               <a:t>reviews</a:t>
             </a:r>
             <a:r>
-              <a:rPr lang="de-DE" sz="2400" dirty="0">
+              <a:rPr lang="de-DE" dirty="0">
                 <a:solidFill>
                   <a:srgbClr val="000000"/>
                 </a:solidFill>
@@ -6221,42 +7029,104 @@
             </a:r>
           </a:p>
           <a:p>
-            <a:pPr lvl="2">
+            <a:pPr lvl="1">
+              <a:lnSpc>
+                <a:spcPct val="150000"/>
+              </a:lnSpc>
               <a:buFontTx/>
               <a:buChar char="-"/>
             </a:pPr>
             <a:r>
-              <a:rPr lang="de-DE" sz="2000" dirty="0" err="1"/>
-              <a:t>EGerrit</a:t>
-            </a:r>
-            <a:r>
-              <a:rPr lang="de-DE" sz="2000" dirty="0"/>
+              <a:rPr lang="en-US" dirty="0" err="1"/>
+              <a:t>CodeFlow</a:t>
+            </a:r>
+            <a:r>
+              <a:rPr lang="en-US" dirty="0"/>
+              <a:t>, Mondrian, </a:t>
+            </a:r>
+            <a:r>
+              <a:rPr lang="en-US" dirty="0" err="1"/>
+              <a:t>Gerrit</a:t>
+            </a:r>
+            <a:r>
+              <a:rPr lang="en-US" dirty="0"/>
+              <a:t>, Phabricator, </a:t>
+            </a:r>
+            <a:r>
+              <a:rPr lang="de-DE" dirty="0" err="1"/>
+              <a:t>ClusterChanges</a:t>
+            </a:r>
+            <a:r>
+              <a:rPr lang="de-DE" dirty="0"/>
               <a:t> </a:t>
             </a:r>
-            <a:r>
-              <a:rPr lang="de-DE" sz="2000" dirty="0" err="1"/>
-              <a:t>as</a:t>
-            </a:r>
-            <a:r>
-              <a:rPr lang="de-DE" sz="2000" dirty="0"/>
-              <a:t> </a:t>
-            </a:r>
-            <a:r>
-              <a:rPr lang="de-DE" sz="2000" dirty="0" err="1"/>
-              <a:t>Eclipse</a:t>
-            </a:r>
-            <a:r>
-              <a:rPr lang="de-DE" sz="2000" dirty="0"/>
-              <a:t> Plug-In</a:t>
-            </a:r>
-          </a:p>
-          <a:p>
-            <a:pPr lvl="1">
+          </a:p>
+          <a:p>
+            <a:pPr>
+              <a:lnSpc>
+                <a:spcPct val="150000"/>
+              </a:lnSpc>
               <a:buFontTx/>
               <a:buChar char="-"/>
             </a:pPr>
             <a:r>
-              <a:rPr lang="de-DE" sz="2400" b="1" dirty="0">
+              <a:rPr lang="de-DE" dirty="0"/>
+              <a:t>Plug-Ins</a:t>
+            </a:r>
+          </a:p>
+          <a:p>
+            <a:pPr lvl="1">
+              <a:lnSpc>
+                <a:spcPct val="150000"/>
+              </a:lnSpc>
+              <a:buFontTx/>
+              <a:buChar char="-"/>
+            </a:pPr>
+            <a:r>
+              <a:rPr lang="de-DE" dirty="0" err="1"/>
+              <a:t>EGerrit</a:t>
+            </a:r>
+            <a:r>
+              <a:rPr lang="de-DE" dirty="0"/>
+              <a:t> </a:t>
+            </a:r>
+            <a:r>
+              <a:rPr lang="de-DE" dirty="0" err="1"/>
+              <a:t>as</a:t>
+            </a:r>
+            <a:r>
+              <a:rPr lang="de-DE" dirty="0"/>
+              <a:t> </a:t>
+            </a:r>
+            <a:r>
+              <a:rPr lang="de-DE" dirty="0" err="1"/>
+              <a:t>Eclipse</a:t>
+            </a:r>
+            <a:r>
+              <a:rPr lang="de-DE" dirty="0"/>
+              <a:t> Plug-In</a:t>
+            </a:r>
+          </a:p>
+          <a:p>
+            <a:pPr lvl="1">
+              <a:lnSpc>
+                <a:spcPct val="150000"/>
+              </a:lnSpc>
+              <a:buFontTx/>
+              <a:buChar char="-"/>
+            </a:pPr>
+            <a:endParaRPr lang="de-DE" dirty="0"/>
+          </a:p>
+          <a:p>
+            <a:pPr>
+              <a:lnSpc>
+                <a:spcPct val="150000"/>
+              </a:lnSpc>
+              <a:buFontTx/>
+              <a:buChar char="-"/>
+            </a:pPr>
+            <a:r>
+              <a:rPr lang="de-DE" b="1" dirty="0">
                 <a:solidFill>
                   <a:srgbClr val="DD640C"/>
                 </a:solidFill>
@@ -6264,7 +7134,7 @@
               <a:t>Pull-</a:t>
             </a:r>
             <a:r>
-              <a:rPr lang="de-DE" sz="2400" b="1" dirty="0" err="1">
+              <a:rPr lang="de-DE" b="1" dirty="0" err="1">
                 <a:solidFill>
                   <a:srgbClr val="DD640C"/>
                 </a:solidFill>
@@ -6272,30 +7142,33 @@
               <a:t>based</a:t>
             </a:r>
             <a:r>
-              <a:rPr lang="de-DE" sz="2400" dirty="0"/>
+              <a:rPr lang="de-DE" dirty="0"/>
               <a:t> </a:t>
             </a:r>
             <a:r>
-              <a:rPr lang="de-DE" sz="2400" dirty="0" err="1"/>
+              <a:rPr lang="de-DE" dirty="0" err="1"/>
               <a:t>code</a:t>
             </a:r>
             <a:r>
-              <a:rPr lang="de-DE" sz="2400" dirty="0"/>
+              <a:rPr lang="de-DE" dirty="0"/>
               <a:t> </a:t>
             </a:r>
             <a:r>
-              <a:rPr lang="de-DE" sz="2400" dirty="0" err="1"/>
+              <a:rPr lang="de-DE" dirty="0" err="1"/>
               <a:t>reviews</a:t>
             </a:r>
-            <a:endParaRPr lang="de-DE" sz="2400" dirty="0"/>
-          </a:p>
-          <a:p>
-            <a:pPr lvl="1">
+            <a:endParaRPr lang="de-DE" dirty="0"/>
+          </a:p>
+          <a:p>
+            <a:pPr>
+              <a:lnSpc>
+                <a:spcPct val="150000"/>
+              </a:lnSpc>
               <a:buFontTx/>
               <a:buChar char="-"/>
             </a:pPr>
             <a:r>
-              <a:rPr lang="de-DE" sz="2400" b="1" dirty="0">
+              <a:rPr lang="de-DE" b="1" dirty="0">
                 <a:solidFill>
                   <a:srgbClr val="DD640C"/>
                 </a:solidFill>
@@ -6303,7 +7176,7 @@
               <a:t>Change-</a:t>
             </a:r>
             <a:r>
-              <a:rPr lang="de-DE" sz="2400" b="1" dirty="0" err="1">
+              <a:rPr lang="de-DE" b="1" dirty="0" err="1">
                 <a:solidFill>
                   <a:srgbClr val="DD640C"/>
                 </a:solidFill>
@@ -6311,7 +7184,7 @@
               <a:t>based</a:t>
             </a:r>
             <a:r>
-              <a:rPr lang="de-DE" sz="2400" b="1" dirty="0">
+              <a:rPr lang="de-DE" b="1" dirty="0">
                 <a:solidFill>
                   <a:srgbClr val="DD640C"/>
                 </a:solidFill>
@@ -6319,21 +7192,24 @@
               <a:t> </a:t>
             </a:r>
             <a:r>
-              <a:rPr lang="de-DE" sz="2400" dirty="0" err="1"/>
+              <a:rPr lang="de-DE" dirty="0" err="1"/>
               <a:t>code</a:t>
             </a:r>
             <a:r>
-              <a:rPr lang="de-DE" sz="2400" dirty="0"/>
+              <a:rPr lang="de-DE" dirty="0"/>
               <a:t> </a:t>
             </a:r>
             <a:r>
-              <a:rPr lang="de-DE" sz="2400" dirty="0" err="1"/>
+              <a:rPr lang="de-DE" dirty="0" err="1"/>
               <a:t>reviews</a:t>
             </a:r>
-            <a:endParaRPr lang="de-DE" sz="2400" dirty="0"/>
+            <a:endParaRPr lang="de-DE" dirty="0"/>
           </a:p>
           <a:p>
             <a:pPr>
+              <a:lnSpc>
+                <a:spcPct val="150000"/>
+              </a:lnSpc>
               <a:buFontTx/>
               <a:buChar char="-"/>
             </a:pPr>

</xml_diff>

<commit_message>
[Programming] Final SRC version
</commit_message>
<xml_diff>
--- a/Programming_SRC/talk.pptx
+++ b/Programming_SRC/talk.pptx
@@ -1711,7 +1711,7 @@
           <a:graphicData uri="http://schemas.openxmlformats.org/presentationml/2006/ole">
             <mc:AlternateContent xmlns:mc="http://schemas.openxmlformats.org/markup-compatibility/2006">
               <mc:Choice xmlns:v="urn:schemas-microsoft-com:vml" Requires="v">
-                <p:oleObj spid="_x0000_s140756" name="Image" r:id="rId3" imgW="3221337" imgH="1845301" progId="Photoshop.Image.9">
+                <p:oleObj spid="_x0000_s140757" name="Image" r:id="rId3" imgW="3221337" imgH="1845301" progId="Photoshop.Image.9">
                   <p:embed/>
                 </p:oleObj>
               </mc:Choice>
@@ -2881,7 +2881,7 @@
           <a:graphicData uri="http://schemas.openxmlformats.org/presentationml/2006/ole">
             <mc:AlternateContent xmlns:mc="http://schemas.openxmlformats.org/markup-compatibility/2006">
               <mc:Choice xmlns:v="urn:schemas-microsoft-com:vml" Requires="v">
-                <p:oleObj spid="_x0000_s1500" name="Image" r:id="rId7" imgW="3221337" imgH="1845301" progId="Photoshop.Image.9">
+                <p:oleObj spid="_x0000_s1501" name="Image" r:id="rId7" imgW="3221337" imgH="1845301" progId="Photoshop.Image.9">
                   <p:embed/>
                 </p:oleObj>
               </mc:Choice>

</xml_diff>